<commit_message>
All code + present
</commit_message>
<xml_diff>
--- a/present/PROJECT_MOBILE_65313396.pptx
+++ b/present/PROJECT_MOBILE_65313396.pptx
@@ -1,37 +1,37 @@
 
 <file path=ppt/presentation.xml><?xml version="1.0" encoding="utf-8"?>
-<p:presentation xmlns:a="http://schemas.openxmlformats.org/drawingml/2006/main" xmlns:r="http://schemas.openxmlformats.org/officeDocument/2006/relationships" xmlns:p="http://schemas.openxmlformats.org/presentationml/2006/main" saveSubsetFonts="1" embedTrueTypeFonts="true">
+<p:presentation xmlns:a="http://schemas.openxmlformats.org/drawingml/2006/main" xmlns:r="http://schemas.openxmlformats.org/officeDocument/2006/relationships" xmlns:p="http://schemas.openxmlformats.org/presentationml/2006/main" embedTrueTypeFonts="1" saveSubsetFonts="1">
   <p:sldMasterIdLst>
     <p:sldMasterId id="2147483648" r:id="rId1"/>
   </p:sldMasterIdLst>
   <p:sldIdLst>
-    <p:sldId id="256" r:id="rId6"/>
-    <p:sldId id="257" r:id="rId7"/>
-    <p:sldId id="258" r:id="rId8"/>
-    <p:sldId id="259" r:id="rId9"/>
+    <p:sldId id="256" r:id="rId2"/>
+    <p:sldId id="257" r:id="rId3"/>
+    <p:sldId id="258" r:id="rId4"/>
+    <p:sldId id="259" r:id="rId5"/>
   </p:sldIdLst>
   <p:sldSz cx="18288000" cy="10287000"/>
   <p:notesSz cx="6858000" cy="9144000"/>
   <p:embeddedFontLst>
     <p:embeddedFont>
-      <p:font typeface="Oswald Bold" charset="1" panose="00000800000000000000"/>
-      <p:regular r:id="rId10"/>
+      <p:font typeface="Canva Sans" panose="020B0604020202020204" charset="0"/>
+      <p:regular r:id="rId6"/>
     </p:embeddedFont>
     <p:embeddedFont>
-      <p:font typeface="Montserrat Classic Bold" charset="1" panose="00000800000000000000"/>
-      <p:regular r:id="rId11"/>
+      <p:font typeface="Canva Sans Bold" panose="020B0604020202020204" charset="0"/>
+      <p:regular r:id="rId7"/>
     </p:embeddedFont>
     <p:embeddedFont>
-      <p:font typeface="DM Sans" charset="1" panose="00000000000000000000"/>
-      <p:regular r:id="rId12"/>
+      <p:font typeface="DM Sans" pitchFamily="2" charset="0"/>
+      <p:regular r:id="rId8"/>
     </p:embeddedFont>
     <p:embeddedFont>
-      <p:font typeface="Canva Sans Bold" charset="1" panose="020B0803030501040103"/>
-      <p:regular r:id="rId13"/>
+      <p:font typeface="Montserrat Classic Bold" panose="020B0604020202020204" charset="0"/>
+      <p:regular r:id="rId9"/>
     </p:embeddedFont>
     <p:embeddedFont>
-      <p:font typeface="Canva Sans" charset="1" panose="020B0503030501040103"/>
-      <p:regular r:id="rId14"/>
+      <p:font typeface="Oswald Bold" panose="020B0604020202020204" charset="0"/>
+      <p:regular r:id="rId10"/>
     </p:embeddedFont>
   </p:embeddedFontLst>
   <p:defaultTextStyle>
@@ -129,6 +129,22 @@
       </a:defRPr>
     </a:lvl9pPr>
   </p:defaultTextStyle>
+  <p:extLst>
+    <p:ext uri="{EFAFB233-063F-42B5-8137-9DF3F51BA10A}">
+      <p15:sldGuideLst xmlns:p15="http://schemas.microsoft.com/office/powerpoint/2012/main">
+        <p15:guide id="1" orient="horz" pos="2160">
+          <p15:clr>
+            <a:srgbClr val="A4A3A4"/>
+          </p15:clr>
+        </p15:guide>
+        <p15:guide id="2" pos="2880">
+          <p15:clr>
+            <a:srgbClr val="A4A3A4"/>
+          </p15:clr>
+        </p15:guide>
+      </p15:sldGuideLst>
+    </p:ext>
+  </p:extLst>
 </p:presentation>
 </file>
 
@@ -170,10 +186,9 @@
           <a:lstStyle/>
           <a:p>
             <a:r>
-              <a:rPr lang="en-US" smtClean="0"/>
+              <a:rPr lang="en-US"/>
               <a:t>Click to edit Master title style</a:t>
             </a:r>
-            <a:endParaRPr lang="en-US"/>
           </a:p>
         </p:txBody>
       </p:sp>
@@ -289,10 +304,9 @@
           </a:lstStyle>
           <a:p>
             <a:r>
-              <a:rPr lang="en-US" smtClean="0"/>
+              <a:rPr lang="en-US"/>
               <a:t>Click to edit Master subtitle style</a:t>
             </a:r>
-            <a:endParaRPr lang="en-US"/>
           </a:p>
         </p:txBody>
       </p:sp>
@@ -314,7 +328,7 @@
             <a:fld id="{1D8BD707-D9CF-40AE-B4C6-C98DA3205C09}" type="datetimeFigureOut">
               <a:rPr lang="en-US" smtClean="0"/>
               <a:pPr/>
-              <a:t>8/1/2011</a:t>
+              <a:t>10/11/2024</a:t>
             </a:fld>
             <a:endParaRPr lang="en-US"/>
           </a:p>
@@ -404,10 +418,9 @@
           <a:lstStyle/>
           <a:p>
             <a:r>
-              <a:rPr lang="en-US" smtClean="0"/>
+              <a:rPr lang="en-US"/>
               <a:t>Click to edit Master title style</a:t>
             </a:r>
-            <a:endParaRPr lang="en-US"/>
           </a:p>
         </p:txBody>
       </p:sp>
@@ -428,38 +441,37 @@
           <a:p>
             <a:pPr lvl="0"/>
             <a:r>
-              <a:rPr lang="en-US" smtClean="0"/>
+              <a:rPr lang="en-US"/>
               <a:t>Click to edit Master text styles</a:t>
             </a:r>
           </a:p>
           <a:p>
             <a:pPr lvl="1"/>
             <a:r>
-              <a:rPr lang="en-US" smtClean="0"/>
+              <a:rPr lang="en-US"/>
               <a:t>Second level</a:t>
             </a:r>
           </a:p>
           <a:p>
             <a:pPr lvl="2"/>
             <a:r>
-              <a:rPr lang="en-US" smtClean="0"/>
+              <a:rPr lang="en-US"/>
               <a:t>Third level</a:t>
             </a:r>
           </a:p>
           <a:p>
             <a:pPr lvl="3"/>
             <a:r>
-              <a:rPr lang="en-US" smtClean="0"/>
+              <a:rPr lang="en-US"/>
               <a:t>Fourth level</a:t>
             </a:r>
           </a:p>
           <a:p>
             <a:pPr lvl="4"/>
             <a:r>
-              <a:rPr lang="en-US" smtClean="0"/>
+              <a:rPr lang="en-US"/>
               <a:t>Fifth level</a:t>
             </a:r>
-            <a:endParaRPr lang="en-US"/>
           </a:p>
         </p:txBody>
       </p:sp>
@@ -481,7 +493,7 @@
             <a:fld id="{1D8BD707-D9CF-40AE-B4C6-C98DA3205C09}" type="datetimeFigureOut">
               <a:rPr lang="en-US" smtClean="0"/>
               <a:pPr/>
-              <a:t>8/1/2011</a:t>
+              <a:t>10/11/2024</a:t>
             </a:fld>
             <a:endParaRPr lang="en-US"/>
           </a:p>
@@ -576,10 +588,9 @@
           <a:lstStyle/>
           <a:p>
             <a:r>
-              <a:rPr lang="en-US" smtClean="0"/>
+              <a:rPr lang="en-US"/>
               <a:t>Click to edit Master title style</a:t>
             </a:r>
-            <a:endParaRPr lang="en-US"/>
           </a:p>
         </p:txBody>
       </p:sp>
@@ -605,38 +616,37 @@
           <a:p>
             <a:pPr lvl="0"/>
             <a:r>
-              <a:rPr lang="en-US" smtClean="0"/>
+              <a:rPr lang="en-US"/>
               <a:t>Click to edit Master text styles</a:t>
             </a:r>
           </a:p>
           <a:p>
             <a:pPr lvl="1"/>
             <a:r>
-              <a:rPr lang="en-US" smtClean="0"/>
+              <a:rPr lang="en-US"/>
               <a:t>Second level</a:t>
             </a:r>
           </a:p>
           <a:p>
             <a:pPr lvl="2"/>
             <a:r>
-              <a:rPr lang="en-US" smtClean="0"/>
+              <a:rPr lang="en-US"/>
               <a:t>Third level</a:t>
             </a:r>
           </a:p>
           <a:p>
             <a:pPr lvl="3"/>
             <a:r>
-              <a:rPr lang="en-US" smtClean="0"/>
+              <a:rPr lang="en-US"/>
               <a:t>Fourth level</a:t>
             </a:r>
           </a:p>
           <a:p>
             <a:pPr lvl="4"/>
             <a:r>
-              <a:rPr lang="en-US" smtClean="0"/>
+              <a:rPr lang="en-US"/>
               <a:t>Fifth level</a:t>
             </a:r>
-            <a:endParaRPr lang="en-US"/>
           </a:p>
         </p:txBody>
       </p:sp>
@@ -658,7 +668,7 @@
             <a:fld id="{1D8BD707-D9CF-40AE-B4C6-C98DA3205C09}" type="datetimeFigureOut">
               <a:rPr lang="en-US" smtClean="0"/>
               <a:pPr/>
-              <a:t>8/1/2011</a:t>
+              <a:t>10/11/2024</a:t>
             </a:fld>
             <a:endParaRPr lang="en-US"/>
           </a:p>
@@ -748,10 +758,9 @@
           <a:lstStyle/>
           <a:p>
             <a:r>
-              <a:rPr lang="en-US" smtClean="0"/>
+              <a:rPr lang="en-US"/>
               <a:t>Click to edit Master title style</a:t>
             </a:r>
-            <a:endParaRPr lang="en-US"/>
           </a:p>
         </p:txBody>
       </p:sp>
@@ -772,38 +781,37 @@
           <a:p>
             <a:pPr lvl="0"/>
             <a:r>
-              <a:rPr lang="en-US" smtClean="0"/>
+              <a:rPr lang="en-US"/>
               <a:t>Click to edit Master text styles</a:t>
             </a:r>
           </a:p>
           <a:p>
             <a:pPr lvl="1"/>
             <a:r>
-              <a:rPr lang="en-US" smtClean="0"/>
+              <a:rPr lang="en-US"/>
               <a:t>Second level</a:t>
             </a:r>
           </a:p>
           <a:p>
             <a:pPr lvl="2"/>
             <a:r>
-              <a:rPr lang="en-US" smtClean="0"/>
+              <a:rPr lang="en-US"/>
               <a:t>Third level</a:t>
             </a:r>
           </a:p>
           <a:p>
             <a:pPr lvl="3"/>
             <a:r>
-              <a:rPr lang="en-US" smtClean="0"/>
+              <a:rPr lang="en-US"/>
               <a:t>Fourth level</a:t>
             </a:r>
           </a:p>
           <a:p>
             <a:pPr lvl="4"/>
             <a:r>
-              <a:rPr lang="en-US" smtClean="0"/>
+              <a:rPr lang="en-US"/>
               <a:t>Fifth level</a:t>
             </a:r>
-            <a:endParaRPr lang="en-US"/>
           </a:p>
         </p:txBody>
       </p:sp>
@@ -825,7 +833,7 @@
             <a:fld id="{1D8BD707-D9CF-40AE-B4C6-C98DA3205C09}" type="datetimeFigureOut">
               <a:rPr lang="en-US" smtClean="0"/>
               <a:pPr/>
-              <a:t>8/1/2011</a:t>
+              <a:t>10/11/2024</a:t>
             </a:fld>
             <a:endParaRPr lang="en-US"/>
           </a:p>
@@ -924,10 +932,9 @@
           </a:lstStyle>
           <a:p>
             <a:r>
-              <a:rPr lang="en-US" smtClean="0"/>
+              <a:rPr lang="en-US"/>
               <a:t>Click to edit Master title style</a:t>
             </a:r>
-            <a:endParaRPr lang="en-US"/>
           </a:p>
         </p:txBody>
       </p:sp>
@@ -1044,7 +1051,7 @@
           <a:p>
             <a:pPr lvl="0"/>
             <a:r>
-              <a:rPr lang="en-US" smtClean="0"/>
+              <a:rPr lang="en-US"/>
               <a:t>Click to edit Master text styles</a:t>
             </a:r>
           </a:p>
@@ -1068,7 +1075,7 @@
             <a:fld id="{1D8BD707-D9CF-40AE-B4C6-C98DA3205C09}" type="datetimeFigureOut">
               <a:rPr lang="en-US" smtClean="0"/>
               <a:pPr/>
-              <a:t>8/1/2011</a:t>
+              <a:t>10/11/2024</a:t>
             </a:fld>
             <a:endParaRPr lang="en-US"/>
           </a:p>
@@ -1158,10 +1165,9 @@
           <a:lstStyle/>
           <a:p>
             <a:r>
-              <a:rPr lang="en-US" smtClean="0"/>
+              <a:rPr lang="en-US"/>
               <a:t>Click to edit Master title style</a:t>
             </a:r>
-            <a:endParaRPr lang="en-US"/>
           </a:p>
         </p:txBody>
       </p:sp>
@@ -1215,38 +1221,37 @@
           <a:p>
             <a:pPr lvl="0"/>
             <a:r>
-              <a:rPr lang="en-US" smtClean="0"/>
+              <a:rPr lang="en-US"/>
               <a:t>Click to edit Master text styles</a:t>
             </a:r>
           </a:p>
           <a:p>
             <a:pPr lvl="1"/>
             <a:r>
-              <a:rPr lang="en-US" smtClean="0"/>
+              <a:rPr lang="en-US"/>
               <a:t>Second level</a:t>
             </a:r>
           </a:p>
           <a:p>
             <a:pPr lvl="2"/>
             <a:r>
-              <a:rPr lang="en-US" smtClean="0"/>
+              <a:rPr lang="en-US"/>
               <a:t>Third level</a:t>
             </a:r>
           </a:p>
           <a:p>
             <a:pPr lvl="3"/>
             <a:r>
-              <a:rPr lang="en-US" smtClean="0"/>
+              <a:rPr lang="en-US"/>
               <a:t>Fourth level</a:t>
             </a:r>
           </a:p>
           <a:p>
             <a:pPr lvl="4"/>
             <a:r>
-              <a:rPr lang="en-US" smtClean="0"/>
+              <a:rPr lang="en-US"/>
               <a:t>Fifth level</a:t>
             </a:r>
-            <a:endParaRPr lang="en-US"/>
           </a:p>
         </p:txBody>
       </p:sp>
@@ -1300,38 +1305,37 @@
           <a:p>
             <a:pPr lvl="0"/>
             <a:r>
-              <a:rPr lang="en-US" smtClean="0"/>
+              <a:rPr lang="en-US"/>
               <a:t>Click to edit Master text styles</a:t>
             </a:r>
           </a:p>
           <a:p>
             <a:pPr lvl="1"/>
             <a:r>
-              <a:rPr lang="en-US" smtClean="0"/>
+              <a:rPr lang="en-US"/>
               <a:t>Second level</a:t>
             </a:r>
           </a:p>
           <a:p>
             <a:pPr lvl="2"/>
             <a:r>
-              <a:rPr lang="en-US" smtClean="0"/>
+              <a:rPr lang="en-US"/>
               <a:t>Third level</a:t>
             </a:r>
           </a:p>
           <a:p>
             <a:pPr lvl="3"/>
             <a:r>
-              <a:rPr lang="en-US" smtClean="0"/>
+              <a:rPr lang="en-US"/>
               <a:t>Fourth level</a:t>
             </a:r>
           </a:p>
           <a:p>
             <a:pPr lvl="4"/>
             <a:r>
-              <a:rPr lang="en-US" smtClean="0"/>
+              <a:rPr lang="en-US"/>
               <a:t>Fifth level</a:t>
             </a:r>
-            <a:endParaRPr lang="en-US"/>
           </a:p>
         </p:txBody>
       </p:sp>
@@ -1353,7 +1357,7 @@
             <a:fld id="{1D8BD707-D9CF-40AE-B4C6-C98DA3205C09}" type="datetimeFigureOut">
               <a:rPr lang="en-US" smtClean="0"/>
               <a:pPr/>
-              <a:t>8/1/2011</a:t>
+              <a:t>10/11/2024</a:t>
             </a:fld>
             <a:endParaRPr lang="en-US"/>
           </a:p>
@@ -1447,10 +1451,9 @@
           </a:lstStyle>
           <a:p>
             <a:r>
-              <a:rPr lang="en-US" smtClean="0"/>
+              <a:rPr lang="en-US"/>
               <a:t>Click to edit Master title style</a:t>
             </a:r>
-            <a:endParaRPr lang="en-US"/>
           </a:p>
         </p:txBody>
       </p:sp>
@@ -1513,7 +1516,7 @@
           <a:p>
             <a:pPr lvl="0"/>
             <a:r>
-              <a:rPr lang="en-US" smtClean="0"/>
+              <a:rPr lang="en-US"/>
               <a:t>Click to edit Master text styles</a:t>
             </a:r>
           </a:p>
@@ -1569,38 +1572,37 @@
           <a:p>
             <a:pPr lvl="0"/>
             <a:r>
-              <a:rPr lang="en-US" smtClean="0"/>
+              <a:rPr lang="en-US"/>
               <a:t>Click to edit Master text styles</a:t>
             </a:r>
           </a:p>
           <a:p>
             <a:pPr lvl="1"/>
             <a:r>
-              <a:rPr lang="en-US" smtClean="0"/>
+              <a:rPr lang="en-US"/>
               <a:t>Second level</a:t>
             </a:r>
           </a:p>
           <a:p>
             <a:pPr lvl="2"/>
             <a:r>
-              <a:rPr lang="en-US" smtClean="0"/>
+              <a:rPr lang="en-US"/>
               <a:t>Third level</a:t>
             </a:r>
           </a:p>
           <a:p>
             <a:pPr lvl="3"/>
             <a:r>
-              <a:rPr lang="en-US" smtClean="0"/>
+              <a:rPr lang="en-US"/>
               <a:t>Fourth level</a:t>
             </a:r>
           </a:p>
           <a:p>
             <a:pPr lvl="4"/>
             <a:r>
-              <a:rPr lang="en-US" smtClean="0"/>
+              <a:rPr lang="en-US"/>
               <a:t>Fifth level</a:t>
             </a:r>
-            <a:endParaRPr lang="en-US"/>
           </a:p>
         </p:txBody>
       </p:sp>
@@ -1663,7 +1665,7 @@
           <a:p>
             <a:pPr lvl="0"/>
             <a:r>
-              <a:rPr lang="en-US" smtClean="0"/>
+              <a:rPr lang="en-US"/>
               <a:t>Click to edit Master text styles</a:t>
             </a:r>
           </a:p>
@@ -1719,38 +1721,37 @@
           <a:p>
             <a:pPr lvl="0"/>
             <a:r>
-              <a:rPr lang="en-US" smtClean="0"/>
+              <a:rPr lang="en-US"/>
               <a:t>Click to edit Master text styles</a:t>
             </a:r>
           </a:p>
           <a:p>
             <a:pPr lvl="1"/>
             <a:r>
-              <a:rPr lang="en-US" smtClean="0"/>
+              <a:rPr lang="en-US"/>
               <a:t>Second level</a:t>
             </a:r>
           </a:p>
           <a:p>
             <a:pPr lvl="2"/>
             <a:r>
-              <a:rPr lang="en-US" smtClean="0"/>
+              <a:rPr lang="en-US"/>
               <a:t>Third level</a:t>
             </a:r>
           </a:p>
           <a:p>
             <a:pPr lvl="3"/>
             <a:r>
-              <a:rPr lang="en-US" smtClean="0"/>
+              <a:rPr lang="en-US"/>
               <a:t>Fourth level</a:t>
             </a:r>
           </a:p>
           <a:p>
             <a:pPr lvl="4"/>
             <a:r>
-              <a:rPr lang="en-US" smtClean="0"/>
+              <a:rPr lang="en-US"/>
               <a:t>Fifth level</a:t>
             </a:r>
-            <a:endParaRPr lang="en-US"/>
           </a:p>
         </p:txBody>
       </p:sp>
@@ -1772,7 +1773,7 @@
             <a:fld id="{1D8BD707-D9CF-40AE-B4C6-C98DA3205C09}" type="datetimeFigureOut">
               <a:rPr lang="en-US" smtClean="0"/>
               <a:pPr/>
-              <a:t>8/1/2011</a:t>
+              <a:t>10/11/2024</a:t>
             </a:fld>
             <a:endParaRPr lang="en-US"/>
           </a:p>
@@ -1862,10 +1863,9 @@
           <a:lstStyle/>
           <a:p>
             <a:r>
-              <a:rPr lang="en-US" smtClean="0"/>
+              <a:rPr lang="en-US"/>
               <a:t>Click to edit Master title style</a:t>
             </a:r>
-            <a:endParaRPr lang="en-US"/>
           </a:p>
         </p:txBody>
       </p:sp>
@@ -1887,7 +1887,7 @@
             <a:fld id="{1D8BD707-D9CF-40AE-B4C6-C98DA3205C09}" type="datetimeFigureOut">
               <a:rPr lang="en-US" smtClean="0"/>
               <a:pPr/>
-              <a:t>8/1/2011</a:t>
+              <a:t>10/11/2024</a:t>
             </a:fld>
             <a:endParaRPr lang="en-US"/>
           </a:p>
@@ -1979,7 +1979,7 @@
             <a:fld id="{1D8BD707-D9CF-40AE-B4C6-C98DA3205C09}" type="datetimeFigureOut">
               <a:rPr lang="en-US" smtClean="0"/>
               <a:pPr/>
-              <a:t>8/1/2011</a:t>
+              <a:t>10/11/2024</a:t>
             </a:fld>
             <a:endParaRPr lang="en-US"/>
           </a:p>
@@ -2078,10 +2078,9 @@
           </a:lstStyle>
           <a:p>
             <a:r>
-              <a:rPr lang="en-US" smtClean="0"/>
+              <a:rPr lang="en-US"/>
               <a:t>Click to edit Master title style</a:t>
             </a:r>
-            <a:endParaRPr lang="en-US"/>
           </a:p>
         </p:txBody>
       </p:sp>
@@ -2135,38 +2134,37 @@
           <a:p>
             <a:pPr lvl="0"/>
             <a:r>
-              <a:rPr lang="en-US" smtClean="0"/>
+              <a:rPr lang="en-US"/>
               <a:t>Click to edit Master text styles</a:t>
             </a:r>
           </a:p>
           <a:p>
             <a:pPr lvl="1"/>
             <a:r>
-              <a:rPr lang="en-US" smtClean="0"/>
+              <a:rPr lang="en-US"/>
               <a:t>Second level</a:t>
             </a:r>
           </a:p>
           <a:p>
             <a:pPr lvl="2"/>
             <a:r>
-              <a:rPr lang="en-US" smtClean="0"/>
+              <a:rPr lang="en-US"/>
               <a:t>Third level</a:t>
             </a:r>
           </a:p>
           <a:p>
             <a:pPr lvl="3"/>
             <a:r>
-              <a:rPr lang="en-US" smtClean="0"/>
+              <a:rPr lang="en-US"/>
               <a:t>Fourth level</a:t>
             </a:r>
           </a:p>
           <a:p>
             <a:pPr lvl="4"/>
             <a:r>
-              <a:rPr lang="en-US" smtClean="0"/>
+              <a:rPr lang="en-US"/>
               <a:t>Fifth level</a:t>
             </a:r>
-            <a:endParaRPr lang="en-US"/>
           </a:p>
         </p:txBody>
       </p:sp>
@@ -2229,7 +2227,7 @@
           <a:p>
             <a:pPr lvl="0"/>
             <a:r>
-              <a:rPr lang="en-US" smtClean="0"/>
+              <a:rPr lang="en-US"/>
               <a:t>Click to edit Master text styles</a:t>
             </a:r>
           </a:p>
@@ -2253,7 +2251,7 @@
             <a:fld id="{1D8BD707-D9CF-40AE-B4C6-C98DA3205C09}" type="datetimeFigureOut">
               <a:rPr lang="en-US" smtClean="0"/>
               <a:pPr/>
-              <a:t>8/1/2011</a:t>
+              <a:t>10/11/2024</a:t>
             </a:fld>
             <a:endParaRPr lang="en-US"/>
           </a:p>
@@ -2352,10 +2350,9 @@
           </a:lstStyle>
           <a:p>
             <a:r>
-              <a:rPr lang="en-US" smtClean="0"/>
+              <a:rPr lang="en-US"/>
               <a:t>Click to edit Master title style</a:t>
             </a:r>
-            <a:endParaRPr lang="en-US"/>
           </a:p>
         </p:txBody>
       </p:sp>
@@ -2479,7 +2476,7 @@
           <a:p>
             <a:pPr lvl="0"/>
             <a:r>
-              <a:rPr lang="en-US" smtClean="0"/>
+              <a:rPr lang="en-US"/>
               <a:t>Click to edit Master text styles</a:t>
             </a:r>
           </a:p>
@@ -2503,7 +2500,7 @@
             <a:fld id="{1D8BD707-D9CF-40AE-B4C6-C98DA3205C09}" type="datetimeFigureOut">
               <a:rPr lang="en-US" smtClean="0"/>
               <a:pPr/>
-              <a:t>8/1/2011</a:t>
+              <a:t>10/11/2024</a:t>
             </a:fld>
             <a:endParaRPr lang="en-US"/>
           </a:p>
@@ -2608,10 +2605,9 @@
           <a:lstStyle/>
           <a:p>
             <a:r>
-              <a:rPr lang="en-US" smtClean="0"/>
+              <a:rPr lang="en-US"/>
               <a:t>Click to edit Master title style</a:t>
             </a:r>
-            <a:endParaRPr lang="en-US"/>
           </a:p>
         </p:txBody>
       </p:sp>
@@ -2642,38 +2638,37 @@
           <a:p>
             <a:pPr lvl="0"/>
             <a:r>
-              <a:rPr lang="en-US" smtClean="0"/>
+              <a:rPr lang="en-US"/>
               <a:t>Click to edit Master text styles</a:t>
             </a:r>
           </a:p>
           <a:p>
             <a:pPr lvl="1"/>
             <a:r>
-              <a:rPr lang="en-US" smtClean="0"/>
+              <a:rPr lang="en-US"/>
               <a:t>Second level</a:t>
             </a:r>
           </a:p>
           <a:p>
             <a:pPr lvl="2"/>
             <a:r>
-              <a:rPr lang="en-US" smtClean="0"/>
+              <a:rPr lang="en-US"/>
               <a:t>Third level</a:t>
             </a:r>
           </a:p>
           <a:p>
             <a:pPr lvl="3"/>
             <a:r>
-              <a:rPr lang="en-US" smtClean="0"/>
+              <a:rPr lang="en-US"/>
               <a:t>Fourth level</a:t>
             </a:r>
           </a:p>
           <a:p>
             <a:pPr lvl="4"/>
             <a:r>
-              <a:rPr lang="en-US" smtClean="0"/>
+              <a:rPr lang="en-US"/>
               <a:t>Fifth level</a:t>
             </a:r>
-            <a:endParaRPr lang="en-US"/>
           </a:p>
         </p:txBody>
       </p:sp>
@@ -2713,7 +2708,7 @@
             <a:fld id="{1D8BD707-D9CF-40AE-B4C6-C98DA3205C09}" type="datetimeFigureOut">
               <a:rPr lang="en-US" smtClean="0"/>
               <a:pPr/>
-              <a:t>8/1/2011</a:t>
+              <a:t>10/11/2024</a:t>
             </a:fld>
             <a:endParaRPr lang="en-US"/>
           </a:p>
@@ -3068,7 +3063,7 @@
 </file>
 
 <file path=ppt/slides/slide1.xml><?xml version="1.0" encoding="utf-8"?>
-<p:sld xmlns:p="http://schemas.openxmlformats.org/presentationml/2006/main" xmlns:a="http://schemas.openxmlformats.org/drawingml/2006/main" xmlns:r="http://schemas.openxmlformats.org/officeDocument/2006/relationships">
+<p:sld xmlns:a="http://schemas.openxmlformats.org/drawingml/2006/main" xmlns:r="http://schemas.openxmlformats.org/officeDocument/2006/relationships" xmlns:p="http://schemas.openxmlformats.org/presentationml/2006/main">
   <p:cSld>
     <p:spTree>
       <p:nvGrpSpPr>
@@ -3086,12 +3081,12 @@
       </p:grpSpPr>
       <p:sp>
         <p:nvSpPr>
-          <p:cNvPr name="Freeform 2" id="2"/>
+          <p:cNvPr id="2" name="Freeform 2"/>
           <p:cNvSpPr/>
           <p:nvPr/>
         </p:nvSpPr>
         <p:spPr>
-          <a:xfrm flipH="true" flipV="true" rot="0">
+          <a:xfrm flipH="1" flipV="1">
             <a:off x="0" y="0"/>
             <a:ext cx="18288000" cy="10287000"/>
           </a:xfrm>
@@ -3100,9 +3095,9 @@
             <a:gdLst/>
             <a:ahLst/>
             <a:cxnLst/>
-            <a:rect r="r" b="b" t="t" l="l"/>
+            <a:rect l="l" t="t" r="r" b="b"/>
             <a:pathLst>
-              <a:path h="10287000" w="18288000">
+              <a:path w="18288000" h="10287000">
                 <a:moveTo>
                   <a:pt x="18288000" y="10287000"/>
                 </a:moveTo>
@@ -3125,19 +3120,26 @@
           <a:blipFill>
             <a:blip r:embed="rId2"/>
             <a:stretch>
-              <a:fillRect l="0" t="-38888" r="0" b="-38888"/>
+              <a:fillRect t="-38888" b="-38888"/>
             </a:stretch>
           </a:blipFill>
         </p:spPr>
-      </p:sp>
-      <p:sp>
-        <p:nvSpPr>
-          <p:cNvPr name="Freeform 3" id="3"/>
+        <p:txBody>
+          <a:bodyPr/>
+          <a:lstStyle/>
+          <a:p>
+            <a:endParaRPr lang="en-US"/>
+          </a:p>
+        </p:txBody>
+      </p:sp>
+      <p:sp>
+        <p:nvSpPr>
+          <p:cNvPr id="3" name="Freeform 3"/>
           <p:cNvSpPr/>
           <p:nvPr/>
         </p:nvSpPr>
         <p:spPr>
-          <a:xfrm flipH="false" flipV="false" rot="7659121">
+          <a:xfrm rot="7659121">
             <a:off x="15091031" y="5585714"/>
             <a:ext cx="7629294" cy="7828566"/>
           </a:xfrm>
@@ -3146,9 +3148,9 @@
             <a:gdLst/>
             <a:ahLst/>
             <a:cxnLst/>
-            <a:rect r="r" b="b" t="t" l="l"/>
+            <a:rect l="l" t="t" r="r" b="b"/>
             <a:pathLst>
-              <a:path h="7828566" w="7629294">
+              <a:path w="7629294" h="7828566">
                 <a:moveTo>
                   <a:pt x="0" y="0"/>
                 </a:moveTo>
@@ -3177,19 +3179,26 @@
               </a:extLst>
             </a:blip>
             <a:stretch>
-              <a:fillRect l="0" t="0" r="0" b="0"/>
+              <a:fillRect/>
             </a:stretch>
           </a:blipFill>
         </p:spPr>
-      </p:sp>
-      <p:sp>
-        <p:nvSpPr>
-          <p:cNvPr name="Freeform 4" id="4"/>
+        <p:txBody>
+          <a:bodyPr/>
+          <a:lstStyle/>
+          <a:p>
+            <a:endParaRPr lang="en-US"/>
+          </a:p>
+        </p:txBody>
+      </p:sp>
+      <p:sp>
+        <p:nvSpPr>
+          <p:cNvPr id="4" name="Freeform 4"/>
           <p:cNvSpPr/>
           <p:nvPr/>
         </p:nvSpPr>
         <p:spPr>
-          <a:xfrm flipH="false" flipV="false" rot="0">
+          <a:xfrm>
             <a:off x="-3258071" y="-4629150"/>
             <a:ext cx="9022634" cy="9258300"/>
           </a:xfrm>
@@ -3198,9 +3207,9 @@
             <a:gdLst/>
             <a:ahLst/>
             <a:cxnLst/>
-            <a:rect r="r" b="b" t="t" l="l"/>
+            <a:rect l="l" t="t" r="r" b="b"/>
             <a:pathLst>
-              <a:path h="9258300" w="9022634">
+              <a:path w="9022634" h="9258300">
                 <a:moveTo>
                   <a:pt x="0" y="0"/>
                 </a:moveTo>
@@ -3229,19 +3238,26 @@
               </a:extLst>
             </a:blip>
             <a:stretch>
-              <a:fillRect l="0" t="0" r="0" b="0"/>
+              <a:fillRect/>
             </a:stretch>
           </a:blipFill>
         </p:spPr>
+        <p:txBody>
+          <a:bodyPr/>
+          <a:lstStyle/>
+          <a:p>
+            <a:endParaRPr lang="en-US"/>
+          </a:p>
+        </p:txBody>
       </p:sp>
       <p:grpSp>
         <p:nvGrpSpPr>
-          <p:cNvPr name="Group 5" id="5"/>
+          <p:cNvPr id="5" name="Group 5"/>
           <p:cNvGrpSpPr/>
           <p:nvPr/>
         </p:nvGrpSpPr>
         <p:grpSpPr>
-          <a:xfrm rot="0">
+          <a:xfrm>
             <a:off x="4236347" y="3202251"/>
             <a:ext cx="9815307" cy="4208864"/>
             <a:chOff x="0" y="0"/>
@@ -3250,12 +3266,12 @@
         </p:grpSpPr>
         <p:sp>
           <p:nvSpPr>
-            <p:cNvPr name="Freeform 6" id="6"/>
+            <p:cNvPr id="6" name="Freeform 6"/>
             <p:cNvSpPr/>
             <p:nvPr/>
           </p:nvSpPr>
           <p:spPr>
-            <a:xfrm flipH="false" flipV="false" rot="0">
+            <a:xfrm>
               <a:off x="0" y="0"/>
               <a:ext cx="1895495" cy="812800"/>
             </a:xfrm>
@@ -3264,9 +3280,9 @@
               <a:gdLst/>
               <a:ahLst/>
               <a:cxnLst/>
-              <a:rect r="r" b="b" t="t" l="l"/>
+              <a:rect l="l" t="t" r="r" b="b"/>
               <a:pathLst>
-                <a:path h="812800" w="1895495">
+                <a:path w="1895495" h="812800">
                   <a:moveTo>
                     <a:pt x="0" y="0"/>
                   </a:moveTo>
@@ -3296,11 +3312,18 @@
               <a:miter/>
             </a:ln>
           </p:spPr>
+          <p:txBody>
+            <a:bodyPr/>
+            <a:lstStyle/>
+            <a:p>
+              <a:endParaRPr lang="en-US"/>
+            </a:p>
+          </p:txBody>
         </p:sp>
         <p:sp>
           <p:nvSpPr>
-            <p:cNvPr name="TextBox 7" id="7"/>
-            <p:cNvSpPr txBox="true"/>
+            <p:cNvPr id="7" name="TextBox 7"/>
+            <p:cNvSpPr txBox="1"/>
             <p:nvPr/>
           </p:nvSpPr>
           <p:spPr>
@@ -3313,7 +3336,7 @@
             </a:prstGeom>
           </p:spPr>
           <p:txBody>
-            <a:bodyPr anchor="ctr" rtlCol="false" tIns="50800" lIns="50800" bIns="50800" rIns="50800"/>
+            <a:bodyPr lIns="50800" tIns="50800" rIns="50800" bIns="50800" rtlCol="0" anchor="ctr"/>
             <a:lstStyle/>
             <a:p>
               <a:pPr algn="ctr">
@@ -3321,18 +3344,19 @@
                   <a:spcPts val="2859"/>
                 </a:lnSpc>
               </a:pPr>
+              <a:endParaRPr/>
             </a:p>
           </p:txBody>
         </p:sp>
       </p:grpSp>
       <p:sp>
         <p:nvSpPr>
-          <p:cNvPr name="TextBox 8" id="8"/>
-          <p:cNvSpPr txBox="true"/>
+          <p:cNvPr id="8" name="TextBox 8"/>
+          <p:cNvSpPr txBox="1"/>
           <p:nvPr/>
         </p:nvSpPr>
         <p:spPr>
-          <a:xfrm rot="0">
+          <a:xfrm>
             <a:off x="4236347" y="4367836"/>
             <a:ext cx="9815307" cy="2542302"/>
           </a:xfrm>
@@ -3341,7 +3365,7 @@
           </a:prstGeom>
         </p:spPr>
         <p:txBody>
-          <a:bodyPr anchor="t" rtlCol="false" tIns="0" lIns="0" bIns="0" rIns="0">
+          <a:bodyPr lIns="0" tIns="0" rIns="0" bIns="0" rtlCol="0" anchor="t">
             <a:spAutoFit/>
           </a:bodyPr>
           <a:lstStyle/>
@@ -3352,7 +3376,7 @@
               </a:lnSpc>
             </a:pPr>
             <a:r>
-              <a:rPr lang="en-US" b="true" sz="15038" spc="1473">
+              <a:rPr lang="en-US" sz="15038" b="1" spc="1473">
                 <a:solidFill>
                   <a:srgbClr val="231F20"/>
                 </a:solidFill>
@@ -3368,12 +3392,12 @@
       </p:sp>
       <p:sp>
         <p:nvSpPr>
-          <p:cNvPr name="TextBox 9" id="9"/>
-          <p:cNvSpPr txBox="true"/>
+          <p:cNvPr id="9" name="TextBox 9"/>
+          <p:cNvSpPr txBox="1"/>
           <p:nvPr/>
         </p:nvSpPr>
         <p:spPr>
-          <a:xfrm rot="0">
+          <a:xfrm>
             <a:off x="4236347" y="3438109"/>
             <a:ext cx="9815307" cy="1186902"/>
           </a:xfrm>
@@ -3382,7 +3406,7 @@
           </a:prstGeom>
         </p:spPr>
         <p:txBody>
-          <a:bodyPr anchor="t" rtlCol="false" tIns="0" lIns="0" bIns="0" rIns="0">
+          <a:bodyPr lIns="0" tIns="0" rIns="0" bIns="0" rtlCol="0" anchor="t">
             <a:spAutoFit/>
           </a:bodyPr>
           <a:lstStyle/>
@@ -3393,7 +3417,7 @@
               </a:lnSpc>
             </a:pPr>
             <a:r>
-              <a:rPr lang="en-US" b="true" sz="7063" spc="692">
+              <a:rPr lang="en-US" sz="7063" b="1" spc="692">
                 <a:solidFill>
                   <a:srgbClr val="231F20"/>
                 </a:solidFill>
@@ -3409,12 +3433,12 @@
       </p:sp>
       <p:sp>
         <p:nvSpPr>
-          <p:cNvPr name="TextBox 10" id="10"/>
-          <p:cNvSpPr txBox="true"/>
+          <p:cNvPr id="10" name="TextBox 10"/>
+          <p:cNvSpPr txBox="1"/>
           <p:nvPr/>
         </p:nvSpPr>
         <p:spPr>
-          <a:xfrm rot="0">
+          <a:xfrm>
             <a:off x="2719596" y="7482578"/>
             <a:ext cx="12848809" cy="441638"/>
           </a:xfrm>
@@ -3423,7 +3447,7 @@
           </a:prstGeom>
         </p:spPr>
         <p:txBody>
-          <a:bodyPr anchor="t" rtlCol="false" tIns="0" lIns="0" bIns="0" rIns="0">
+          <a:bodyPr lIns="0" tIns="0" rIns="0" bIns="0" rtlCol="0" anchor="t">
             <a:spAutoFit/>
           </a:bodyPr>
           <a:lstStyle/>
@@ -3434,7 +3458,7 @@
               </a:lnSpc>
             </a:pPr>
             <a:r>
-              <a:rPr lang="en-US" b="true" sz="2653" spc="140">
+              <a:rPr lang="en-US" sz="2653" b="1" spc="140">
                 <a:solidFill>
                   <a:srgbClr val="231F20"/>
                 </a:solidFill>
@@ -3457,13 +3481,14 @@
 </file>
 
 <file path=ppt/slides/slide2.xml><?xml version="1.0" encoding="utf-8"?>
-<p:sld xmlns:p="http://schemas.openxmlformats.org/presentationml/2006/main" xmlns:a="http://schemas.openxmlformats.org/drawingml/2006/main" xmlns:r="http://schemas.openxmlformats.org/officeDocument/2006/relationships">
+<p:sld xmlns:a="http://schemas.openxmlformats.org/drawingml/2006/main" xmlns:r="http://schemas.openxmlformats.org/officeDocument/2006/relationships" xmlns:p="http://schemas.openxmlformats.org/presentationml/2006/main">
   <p:cSld>
     <p:bg>
       <p:bgPr>
         <a:solidFill>
           <a:srgbClr val="F2F4F5"/>
         </a:solidFill>
+        <a:effectLst/>
       </p:bgPr>
     </p:bg>
     <p:spTree>
@@ -3482,12 +3507,12 @@
       </p:grpSpPr>
       <p:sp>
         <p:nvSpPr>
-          <p:cNvPr name="Freeform 2" id="2"/>
+          <p:cNvPr id="2" name="Freeform 2"/>
           <p:cNvSpPr/>
           <p:nvPr/>
         </p:nvSpPr>
         <p:spPr>
-          <a:xfrm flipH="false" flipV="false" rot="7659121">
+          <a:xfrm rot="7659121">
             <a:off x="-4012602" y="5585714"/>
             <a:ext cx="7629294" cy="7828566"/>
           </a:xfrm>
@@ -3496,9 +3521,9 @@
             <a:gdLst/>
             <a:ahLst/>
             <a:cxnLst/>
-            <a:rect r="r" b="b" t="t" l="l"/>
+            <a:rect l="l" t="t" r="r" b="b"/>
             <a:pathLst>
-              <a:path h="7828566" w="7629294">
+              <a:path w="7629294" h="7828566">
                 <a:moveTo>
                   <a:pt x="0" y="0"/>
                 </a:moveTo>
@@ -3527,19 +3552,26 @@
               </a:extLst>
             </a:blip>
             <a:stretch>
-              <a:fillRect l="0" t="0" r="0" b="0"/>
+              <a:fillRect/>
             </a:stretch>
           </a:blipFill>
         </p:spPr>
+        <p:txBody>
+          <a:bodyPr/>
+          <a:lstStyle/>
+          <a:p>
+            <a:endParaRPr lang="en-US"/>
+          </a:p>
+        </p:txBody>
       </p:sp>
       <p:grpSp>
         <p:nvGrpSpPr>
-          <p:cNvPr name="Group 3" id="3"/>
+          <p:cNvPr id="3" name="Group 3"/>
           <p:cNvGrpSpPr/>
           <p:nvPr/>
         </p:nvGrpSpPr>
         <p:grpSpPr>
-          <a:xfrm rot="0">
+          <a:xfrm>
             <a:off x="5019320" y="2901697"/>
             <a:ext cx="1400485" cy="2241803"/>
             <a:chOff x="0" y="0"/>
@@ -3548,12 +3580,12 @@
         </p:grpSpPr>
         <p:sp>
           <p:nvSpPr>
-            <p:cNvPr name="Freeform 4" id="4"/>
+            <p:cNvPr id="4" name="Freeform 4"/>
             <p:cNvSpPr/>
             <p:nvPr/>
           </p:nvSpPr>
           <p:spPr>
-            <a:xfrm flipH="false" flipV="false" rot="0">
+            <a:xfrm>
               <a:off x="0" y="0"/>
               <a:ext cx="368852" cy="590434"/>
             </a:xfrm>
@@ -3562,9 +3594,9 @@
               <a:gdLst/>
               <a:ahLst/>
               <a:cxnLst/>
-              <a:rect r="r" b="b" t="t" l="l"/>
+              <a:rect l="l" t="t" r="r" b="b"/>
               <a:pathLst>
-                <a:path h="590434" w="368852">
+                <a:path w="368852" h="590434">
                   <a:moveTo>
                     <a:pt x="0" y="0"/>
                   </a:moveTo>
@@ -3585,11 +3617,18 @@
               <a:srgbClr val="CCCCCC"/>
             </a:solidFill>
           </p:spPr>
+          <p:txBody>
+            <a:bodyPr/>
+            <a:lstStyle/>
+            <a:p>
+              <a:endParaRPr lang="en-US"/>
+            </a:p>
+          </p:txBody>
         </p:sp>
         <p:sp>
           <p:nvSpPr>
-            <p:cNvPr name="TextBox 5" id="5"/>
-            <p:cNvSpPr txBox="true"/>
+            <p:cNvPr id="5" name="TextBox 5"/>
+            <p:cNvSpPr txBox="1"/>
             <p:nvPr/>
           </p:nvSpPr>
           <p:spPr>
@@ -3602,7 +3641,7 @@
             </a:prstGeom>
           </p:spPr>
           <p:txBody>
-            <a:bodyPr anchor="ctr" rtlCol="false" tIns="50800" lIns="50800" bIns="50800" rIns="50800"/>
+            <a:bodyPr lIns="50800" tIns="50800" rIns="50800" bIns="50800" rtlCol="0" anchor="ctr"/>
             <a:lstStyle/>
             <a:p>
               <a:pPr algn="ctr">
@@ -3610,18 +3649,19 @@
                   <a:spcPts val="2859"/>
                 </a:lnSpc>
               </a:pPr>
+              <a:endParaRPr/>
             </a:p>
           </p:txBody>
         </p:sp>
       </p:grpSp>
       <p:sp>
         <p:nvSpPr>
-          <p:cNvPr name="TextBox 6" id="6"/>
-          <p:cNvSpPr txBox="true"/>
+          <p:cNvPr id="6" name="TextBox 6"/>
+          <p:cNvSpPr txBox="1"/>
           <p:nvPr/>
         </p:nvSpPr>
         <p:spPr>
-          <a:xfrm rot="0">
+          <a:xfrm>
             <a:off x="4980992" y="1036994"/>
             <a:ext cx="7416941" cy="1683727"/>
           </a:xfrm>
@@ -3630,7 +3670,7 @@
           </a:prstGeom>
         </p:spPr>
         <p:txBody>
-          <a:bodyPr anchor="t" rtlCol="false" tIns="0" lIns="0" bIns="0" rIns="0">
+          <a:bodyPr lIns="0" tIns="0" rIns="0" bIns="0" rtlCol="0" anchor="t">
             <a:spAutoFit/>
           </a:bodyPr>
           <a:lstStyle/>
@@ -3641,7 +3681,7 @@
               </a:lnSpc>
             </a:pPr>
             <a:r>
-              <a:rPr lang="en-US" b="true" sz="9981" spc="978">
+              <a:rPr lang="en-US" sz="9981" b="1" spc="978">
                 <a:solidFill>
                   <a:srgbClr val="231F20"/>
                 </a:solidFill>
@@ -3657,12 +3697,12 @@
       </p:sp>
       <p:sp>
         <p:nvSpPr>
-          <p:cNvPr name="Freeform 7" id="7"/>
+          <p:cNvPr id="7" name="Freeform 7"/>
           <p:cNvSpPr/>
           <p:nvPr/>
         </p:nvSpPr>
         <p:spPr>
-          <a:xfrm flipH="false" flipV="false" rot="2016048">
+          <a:xfrm rot="2016048">
             <a:off x="12243487" y="-1005305"/>
             <a:ext cx="10749463" cy="2687366"/>
           </a:xfrm>
@@ -3671,9 +3711,9 @@
             <a:gdLst/>
             <a:ahLst/>
             <a:cxnLst/>
-            <a:rect r="r" b="b" t="t" l="l"/>
+            <a:rect l="l" t="t" r="r" b="b"/>
             <a:pathLst>
-              <a:path h="2687366" w="10749463">
+              <a:path w="10749463" h="2687366">
                 <a:moveTo>
                   <a:pt x="0" y="0"/>
                 </a:moveTo>
@@ -3702,19 +3742,26 @@
               </a:extLst>
             </a:blip>
             <a:stretch>
-              <a:fillRect l="0" t="0" r="0" b="0"/>
+              <a:fillRect/>
             </a:stretch>
           </a:blipFill>
         </p:spPr>
-      </p:sp>
-      <p:sp>
-        <p:nvSpPr>
-          <p:cNvPr name="TextBox 8" id="8"/>
-          <p:cNvSpPr txBox="true"/>
+        <p:txBody>
+          <a:bodyPr/>
+          <a:lstStyle/>
+          <a:p>
+            <a:endParaRPr lang="en-US"/>
+          </a:p>
+        </p:txBody>
+      </p:sp>
+      <p:sp>
+        <p:nvSpPr>
+          <p:cNvPr id="8" name="TextBox 8"/>
+          <p:cNvSpPr txBox="1"/>
           <p:nvPr/>
         </p:nvSpPr>
         <p:spPr>
-          <a:xfrm rot="0">
+          <a:xfrm>
             <a:off x="5231353" y="3225185"/>
             <a:ext cx="937219" cy="657225"/>
           </a:xfrm>
@@ -3723,7 +3770,7 @@
           </a:prstGeom>
         </p:spPr>
         <p:txBody>
-          <a:bodyPr anchor="t" rtlCol="false" tIns="0" lIns="0" bIns="0" rIns="0">
+          <a:bodyPr lIns="0" tIns="0" rIns="0" bIns="0" rtlCol="0" anchor="t">
             <a:spAutoFit/>
           </a:bodyPr>
           <a:lstStyle/>
@@ -3734,7 +3781,7 @@
               </a:lnSpc>
             </a:pPr>
             <a:r>
-              <a:rPr lang="en-US" b="true" sz="4271" i="true">
+              <a:rPr lang="en-US" sz="4271" b="1" i="1">
                 <a:solidFill>
                   <a:srgbClr val="363636"/>
                 </a:solidFill>
@@ -3750,12 +3797,12 @@
       </p:sp>
       <p:sp>
         <p:nvSpPr>
-          <p:cNvPr name="TextBox 9" id="9"/>
-          <p:cNvSpPr txBox="true"/>
+          <p:cNvPr id="9" name="TextBox 9"/>
+          <p:cNvSpPr txBox="1"/>
           <p:nvPr/>
         </p:nvSpPr>
         <p:spPr>
-          <a:xfrm rot="0">
+          <a:xfrm>
             <a:off x="5231353" y="4022304"/>
             <a:ext cx="937219" cy="657225"/>
           </a:xfrm>
@@ -3764,7 +3811,7 @@
           </a:prstGeom>
         </p:spPr>
         <p:txBody>
-          <a:bodyPr anchor="t" rtlCol="false" tIns="0" lIns="0" bIns="0" rIns="0">
+          <a:bodyPr lIns="0" tIns="0" rIns="0" bIns="0" rtlCol="0" anchor="t">
             <a:spAutoFit/>
           </a:bodyPr>
           <a:lstStyle/>
@@ -3775,7 +3822,7 @@
               </a:lnSpc>
             </a:pPr>
             <a:r>
-              <a:rPr lang="en-US" b="true" sz="4271" i="true">
+              <a:rPr lang="en-US" sz="4271" b="1" i="1">
                 <a:solidFill>
                   <a:srgbClr val="363636"/>
                 </a:solidFill>
@@ -3791,12 +3838,12 @@
       </p:sp>
       <p:sp>
         <p:nvSpPr>
-          <p:cNvPr name="TextBox 10" id="10"/>
-          <p:cNvSpPr txBox="true"/>
+          <p:cNvPr id="10" name="TextBox 10"/>
+          <p:cNvSpPr txBox="1"/>
           <p:nvPr/>
         </p:nvSpPr>
         <p:spPr>
-          <a:xfrm rot="0">
+          <a:xfrm>
             <a:off x="6607430" y="3333137"/>
             <a:ext cx="5790503" cy="418548"/>
           </a:xfrm>
@@ -3805,7 +3852,7 @@
           </a:prstGeom>
         </p:spPr>
         <p:txBody>
-          <a:bodyPr anchor="t" rtlCol="false" tIns="0" lIns="0" bIns="0" rIns="0">
+          <a:bodyPr lIns="0" tIns="0" rIns="0" bIns="0" rtlCol="0" anchor="t">
             <a:spAutoFit/>
           </a:bodyPr>
           <a:lstStyle/>
@@ -3832,12 +3879,12 @@
       </p:sp>
       <p:sp>
         <p:nvSpPr>
-          <p:cNvPr name="TextBox 11" id="11"/>
-          <p:cNvSpPr txBox="true"/>
+          <p:cNvPr id="11" name="TextBox 11"/>
+          <p:cNvSpPr txBox="1"/>
           <p:nvPr/>
         </p:nvSpPr>
         <p:spPr>
-          <a:xfrm rot="0">
+          <a:xfrm>
             <a:off x="6607430" y="4127355"/>
             <a:ext cx="6076629" cy="418548"/>
           </a:xfrm>
@@ -3846,7 +3893,7 @@
           </a:prstGeom>
         </p:spPr>
         <p:txBody>
-          <a:bodyPr anchor="t" rtlCol="false" tIns="0" lIns="0" bIns="0" rIns="0">
+          <a:bodyPr lIns="0" tIns="0" rIns="0" bIns="0" rtlCol="0" anchor="t">
             <a:spAutoFit/>
           </a:bodyPr>
           <a:lstStyle/>
@@ -3880,7 +3927,7 @@
 </file>
 
 <file path=ppt/slides/slide3.xml><?xml version="1.0" encoding="utf-8"?>
-<p:sld xmlns:p="http://schemas.openxmlformats.org/presentationml/2006/main" xmlns:a="http://schemas.openxmlformats.org/drawingml/2006/main" xmlns:r="http://schemas.openxmlformats.org/officeDocument/2006/relationships">
+<p:sld xmlns:a="http://schemas.openxmlformats.org/drawingml/2006/main" xmlns:r="http://schemas.openxmlformats.org/officeDocument/2006/relationships" xmlns:p="http://schemas.openxmlformats.org/presentationml/2006/main">
   <p:cSld>
     <p:spTree>
       <p:nvGrpSpPr>
@@ -3898,12 +3945,12 @@
       </p:grpSpPr>
       <p:sp>
         <p:nvSpPr>
-          <p:cNvPr name="Freeform 2" id="2"/>
+          <p:cNvPr id="2" name="Freeform 2"/>
           <p:cNvSpPr/>
           <p:nvPr/>
         </p:nvSpPr>
         <p:spPr>
-          <a:xfrm flipH="true" flipV="true" rot="0">
+          <a:xfrm flipH="1" flipV="1">
             <a:off x="0" y="0"/>
             <a:ext cx="18288000" cy="10287000"/>
           </a:xfrm>
@@ -3912,9 +3959,9 @@
             <a:gdLst/>
             <a:ahLst/>
             <a:cxnLst/>
-            <a:rect r="r" b="b" t="t" l="l"/>
+            <a:rect l="l" t="t" r="r" b="b"/>
             <a:pathLst>
-              <a:path h="10287000" w="18288000">
+              <a:path w="18288000" h="10287000">
                 <a:moveTo>
                   <a:pt x="18288000" y="10287000"/>
                 </a:moveTo>
@@ -3937,19 +3984,26 @@
           <a:blipFill>
             <a:blip r:embed="rId2"/>
             <a:stretch>
-              <a:fillRect l="0" t="-38888" r="0" b="-38888"/>
+              <a:fillRect t="-38888" b="-38888"/>
             </a:stretch>
           </a:blipFill>
         </p:spPr>
-      </p:sp>
-      <p:sp>
-        <p:nvSpPr>
-          <p:cNvPr name="Freeform 3" id="3"/>
+        <p:txBody>
+          <a:bodyPr/>
+          <a:lstStyle/>
+          <a:p>
+            <a:endParaRPr lang="en-US"/>
+          </a:p>
+        </p:txBody>
+      </p:sp>
+      <p:sp>
+        <p:nvSpPr>
+          <p:cNvPr id="3" name="Freeform 3"/>
           <p:cNvSpPr/>
           <p:nvPr/>
         </p:nvSpPr>
         <p:spPr>
-          <a:xfrm flipH="false" flipV="false" rot="887923">
+          <a:xfrm rot="887923">
             <a:off x="13475833" y="-8787301"/>
             <a:ext cx="13977230" cy="14342307"/>
           </a:xfrm>
@@ -3958,9 +4012,9 @@
             <a:gdLst/>
             <a:ahLst/>
             <a:cxnLst/>
-            <a:rect r="r" b="b" t="t" l="l"/>
+            <a:rect l="l" t="t" r="r" b="b"/>
             <a:pathLst>
-              <a:path h="14342307" w="13977230">
+              <a:path w="13977230" h="14342307">
                 <a:moveTo>
                   <a:pt x="0" y="0"/>
                 </a:moveTo>
@@ -3989,19 +4043,26 @@
               </a:extLst>
             </a:blip>
             <a:stretch>
-              <a:fillRect l="0" t="0" r="0" b="0"/>
+              <a:fillRect/>
             </a:stretch>
           </a:blipFill>
         </p:spPr>
-      </p:sp>
-      <p:sp>
-        <p:nvSpPr>
-          <p:cNvPr name="TextBox 4" id="4"/>
-          <p:cNvSpPr txBox="true"/>
+        <p:txBody>
+          <a:bodyPr/>
+          <a:lstStyle/>
+          <a:p>
+            <a:endParaRPr lang="en-US"/>
+          </a:p>
+        </p:txBody>
+      </p:sp>
+      <p:sp>
+        <p:nvSpPr>
+          <p:cNvPr id="4" name="TextBox 4"/>
+          <p:cNvSpPr txBox="1"/>
           <p:nvPr/>
         </p:nvSpPr>
         <p:spPr>
-          <a:xfrm rot="0">
+          <a:xfrm>
             <a:off x="1028700" y="1195362"/>
             <a:ext cx="11286605" cy="1594138"/>
           </a:xfrm>
@@ -4010,12 +4071,12 @@
           </a:prstGeom>
         </p:spPr>
         <p:txBody>
-          <a:bodyPr anchor="t" rtlCol="false" tIns="0" lIns="0" bIns="0" rIns="0">
+          <a:bodyPr lIns="0" tIns="0" rIns="0" bIns="0" rtlCol="0" anchor="t">
             <a:spAutoFit/>
           </a:bodyPr>
           <a:lstStyle/>
           <a:p>
-            <a:pPr algn="ctr" marL="0" indent="0" lvl="0">
+            <a:pPr marL="0" lvl="0" indent="0" algn="ctr">
               <a:lnSpc>
                 <a:spcPts val="13015"/>
               </a:lnSpc>
@@ -4024,7 +4085,7 @@
               </a:spcBef>
             </a:pPr>
             <a:r>
-              <a:rPr lang="en-US" b="true" sz="9431" spc="924">
+              <a:rPr lang="en-US" sz="9431" b="1" spc="924">
                 <a:solidFill>
                   <a:srgbClr val="231F20"/>
                 </a:solidFill>
@@ -4040,12 +4101,12 @@
       </p:sp>
       <p:sp>
         <p:nvSpPr>
-          <p:cNvPr name="Freeform 5" id="5"/>
+          <p:cNvPr id="5" name="Freeform 5"/>
           <p:cNvSpPr/>
           <p:nvPr/>
         </p:nvSpPr>
         <p:spPr>
-          <a:xfrm flipH="false" flipV="false" rot="887923">
+          <a:xfrm rot="887923">
             <a:off x="-8080815" y="5334016"/>
             <a:ext cx="13977230" cy="14342307"/>
           </a:xfrm>
@@ -4054,9 +4115,9 @@
             <a:gdLst/>
             <a:ahLst/>
             <a:cxnLst/>
-            <a:rect r="r" b="b" t="t" l="l"/>
+            <a:rect l="l" t="t" r="r" b="b"/>
             <a:pathLst>
-              <a:path h="14342307" w="13977230">
+              <a:path w="13977230" h="14342307">
                 <a:moveTo>
                   <a:pt x="0" y="0"/>
                 </a:moveTo>
@@ -4085,19 +4146,26 @@
               </a:extLst>
             </a:blip>
             <a:stretch>
-              <a:fillRect l="0" t="0" r="0" b="0"/>
+              <a:fillRect/>
             </a:stretch>
           </a:blipFill>
         </p:spPr>
-      </p:sp>
-      <p:sp>
-        <p:nvSpPr>
-          <p:cNvPr name="TextBox 6" id="6"/>
-          <p:cNvSpPr txBox="true"/>
+        <p:txBody>
+          <a:bodyPr/>
+          <a:lstStyle/>
+          <a:p>
+            <a:endParaRPr lang="en-US"/>
+          </a:p>
+        </p:txBody>
+      </p:sp>
+      <p:sp>
+        <p:nvSpPr>
+          <p:cNvPr id="6" name="TextBox 6"/>
+          <p:cNvSpPr txBox="1"/>
           <p:nvPr/>
         </p:nvSpPr>
         <p:spPr>
-          <a:xfrm rot="0">
+          <a:xfrm>
             <a:off x="1366465" y="2694250"/>
             <a:ext cx="6780372" cy="887095"/>
           </a:xfrm>
@@ -4106,7 +4174,7 @@
           </a:prstGeom>
         </p:spPr>
         <p:txBody>
-          <a:bodyPr anchor="t" rtlCol="false" tIns="0" lIns="0" bIns="0" rIns="0">
+          <a:bodyPr lIns="0" tIns="0" rIns="0" bIns="0" rtlCol="0" anchor="t">
             <a:spAutoFit/>
           </a:bodyPr>
           <a:lstStyle/>
@@ -4117,7 +4185,7 @@
               </a:lnSpc>
             </a:pPr>
             <a:r>
-              <a:rPr lang="en-US" sz="5199" b="true">
+              <a:rPr lang="en-US" sz="5199" b="1">
                 <a:solidFill>
                   <a:srgbClr val="231F20"/>
                 </a:solidFill>
@@ -4133,21 +4201,21 @@
       </p:sp>
       <p:sp>
         <p:nvSpPr>
-          <p:cNvPr name="TextBox 7" id="7"/>
-          <p:cNvSpPr txBox="true"/>
+          <p:cNvPr id="7" name="TextBox 7"/>
+          <p:cNvSpPr txBox="1"/>
           <p:nvPr/>
         </p:nvSpPr>
         <p:spPr>
-          <a:xfrm rot="0">
-            <a:off x="3420055" y="4129707"/>
-            <a:ext cx="863084" cy="580390"/>
+          <a:xfrm>
+            <a:off x="3099929" y="4129707"/>
+            <a:ext cx="1183210" cy="574196"/>
           </a:xfrm>
           <a:prstGeom prst="rect">
             <a:avLst/>
           </a:prstGeom>
         </p:spPr>
         <p:txBody>
-          <a:bodyPr anchor="t" rtlCol="false" tIns="0" lIns="0" bIns="0" rIns="0">
+          <a:bodyPr wrap="square" lIns="0" tIns="0" rIns="0" bIns="0" rtlCol="0" anchor="t">
             <a:spAutoFit/>
           </a:bodyPr>
           <a:lstStyle/>
@@ -4158,7 +4226,7 @@
               </a:lnSpc>
             </a:pPr>
             <a:r>
-              <a:rPr lang="en-US" sz="3399">
+              <a:rPr lang="en-US" sz="3399" dirty="0" err="1">
                 <a:solidFill>
                   <a:srgbClr val="231F20"/>
                 </a:solidFill>
@@ -4167,28 +4235,49 @@
                 <a:cs typeface="Canva Sans"/>
                 <a:sym typeface="Canva Sans"/>
               </a:rPr>
-              <a:t>ลำดำ</a:t>
-            </a:r>
-          </a:p>
-        </p:txBody>
-      </p:sp>
-      <p:sp>
-        <p:nvSpPr>
-          <p:cNvPr name="TextBox 8" id="8"/>
-          <p:cNvSpPr txBox="true"/>
+              <a:t>ลำด</a:t>
+            </a:r>
+            <a:r>
+              <a:rPr lang="th-TH" sz="3399" dirty="0">
+                <a:solidFill>
+                  <a:srgbClr val="231F20"/>
+                </a:solidFill>
+                <a:latin typeface="Canva Sans"/>
+                <a:ea typeface="Canva Sans"/>
+                <a:cs typeface="Canva Sans"/>
+                <a:sym typeface="Canva Sans"/>
+              </a:rPr>
+              <a:t>ับ</a:t>
+            </a:r>
+            <a:endParaRPr lang="en-US" sz="3399" dirty="0">
+              <a:solidFill>
+                <a:srgbClr val="231F20"/>
+              </a:solidFill>
+              <a:latin typeface="Canva Sans"/>
+              <a:ea typeface="Canva Sans"/>
+              <a:cs typeface="Canva Sans"/>
+              <a:sym typeface="Canva Sans"/>
+            </a:endParaRPr>
+          </a:p>
+        </p:txBody>
+      </p:sp>
+      <p:sp>
+        <p:nvSpPr>
+          <p:cNvPr id="8" name="TextBox 8"/>
+          <p:cNvSpPr txBox="1"/>
           <p:nvPr/>
         </p:nvSpPr>
         <p:spPr>
-          <a:xfrm rot="0">
-            <a:off x="5233080" y="4129707"/>
-            <a:ext cx="1905357" cy="580390"/>
+          <a:xfrm>
+            <a:off x="5007040" y="4129707"/>
+            <a:ext cx="2131398" cy="580390"/>
           </a:xfrm>
           <a:prstGeom prst="rect">
             <a:avLst/>
           </a:prstGeom>
         </p:spPr>
         <p:txBody>
-          <a:bodyPr anchor="t" rtlCol="false" tIns="0" lIns="0" bIns="0" rIns="0">
+          <a:bodyPr wrap="square" lIns="0" tIns="0" rIns="0" bIns="0" rtlCol="0" anchor="t">
             <a:spAutoFit/>
           </a:bodyPr>
           <a:lstStyle/>
@@ -4199,7 +4288,7 @@
               </a:lnSpc>
             </a:pPr>
             <a:r>
-              <a:rPr lang="en-US" sz="3399">
+              <a:rPr lang="en-US" sz="3399" dirty="0">
                 <a:solidFill>
                   <a:srgbClr val="231F20"/>
                 </a:solidFill>
@@ -4215,12 +4304,12 @@
       </p:sp>
       <p:sp>
         <p:nvSpPr>
-          <p:cNvPr name="TextBox 9" id="9"/>
-          <p:cNvSpPr txBox="true"/>
+          <p:cNvPr id="9" name="TextBox 9"/>
+          <p:cNvSpPr txBox="1"/>
           <p:nvPr/>
         </p:nvSpPr>
         <p:spPr>
-          <a:xfrm rot="0">
+          <a:xfrm>
             <a:off x="7865760" y="4129707"/>
             <a:ext cx="1763792" cy="580390"/>
           </a:xfrm>
@@ -4229,7 +4318,7 @@
           </a:prstGeom>
         </p:spPr>
         <p:txBody>
-          <a:bodyPr anchor="t" rtlCol="false" tIns="0" lIns="0" bIns="0" rIns="0">
+          <a:bodyPr lIns="0" tIns="0" rIns="0" bIns="0" rtlCol="0" anchor="t">
             <a:spAutoFit/>
           </a:bodyPr>
           <a:lstStyle/>
@@ -4256,21 +4345,21 @@
       </p:sp>
       <p:sp>
         <p:nvSpPr>
-          <p:cNvPr name="TextBox 10" id="10"/>
-          <p:cNvSpPr txBox="true"/>
+          <p:cNvPr id="10" name="TextBox 10"/>
+          <p:cNvSpPr txBox="1"/>
           <p:nvPr/>
         </p:nvSpPr>
         <p:spPr>
-          <a:xfrm rot="0">
-            <a:off x="10353452" y="4129707"/>
-            <a:ext cx="2209443" cy="580390"/>
+          <a:xfrm>
+            <a:off x="10175038" y="4129707"/>
+            <a:ext cx="2387858" cy="580390"/>
           </a:xfrm>
           <a:prstGeom prst="rect">
             <a:avLst/>
           </a:prstGeom>
         </p:spPr>
         <p:txBody>
-          <a:bodyPr anchor="t" rtlCol="false" tIns="0" lIns="0" bIns="0" rIns="0">
+          <a:bodyPr wrap="square" lIns="0" tIns="0" rIns="0" bIns="0" rtlCol="0" anchor="t">
             <a:spAutoFit/>
           </a:bodyPr>
           <a:lstStyle/>
@@ -4281,7 +4370,7 @@
               </a:lnSpc>
             </a:pPr>
             <a:r>
-              <a:rPr lang="en-US" sz="3399">
+              <a:rPr lang="en-US" sz="3399" dirty="0">
                 <a:solidFill>
                   <a:srgbClr val="231F20"/>
                 </a:solidFill>
@@ -4297,12 +4386,12 @@
       </p:sp>
       <p:sp>
         <p:nvSpPr>
-          <p:cNvPr name="TextBox 11" id="11"/>
-          <p:cNvSpPr txBox="true"/>
+          <p:cNvPr id="11" name="TextBox 11"/>
+          <p:cNvSpPr txBox="1"/>
           <p:nvPr/>
         </p:nvSpPr>
         <p:spPr>
-          <a:xfrm rot="0">
+          <a:xfrm>
             <a:off x="13469437" y="4129707"/>
             <a:ext cx="1398508" cy="580390"/>
           </a:xfrm>
@@ -4311,7 +4400,7 @@
           </a:prstGeom>
         </p:spPr>
         <p:txBody>
-          <a:bodyPr anchor="t" rtlCol="false" tIns="0" lIns="0" bIns="0" rIns="0">
+          <a:bodyPr lIns="0" tIns="0" rIns="0" bIns="0" rtlCol="0" anchor="t">
             <a:spAutoFit/>
           </a:bodyPr>
           <a:lstStyle/>
@@ -4338,12 +4427,12 @@
       </p:sp>
       <p:sp>
         <p:nvSpPr>
-          <p:cNvPr name="TextBox 12" id="12"/>
-          <p:cNvSpPr txBox="true"/>
+          <p:cNvPr id="12" name="TextBox 12"/>
+          <p:cNvSpPr txBox="1"/>
           <p:nvPr/>
         </p:nvSpPr>
         <p:spPr>
-          <a:xfrm rot="0">
+          <a:xfrm>
             <a:off x="3736702" y="5076825"/>
             <a:ext cx="229791" cy="580390"/>
           </a:xfrm>
@@ -4352,7 +4441,663 @@
           </a:prstGeom>
         </p:spPr>
         <p:txBody>
-          <a:bodyPr anchor="t" rtlCol="false" tIns="0" lIns="0" bIns="0" rIns="0">
+          <a:bodyPr lIns="0" tIns="0" rIns="0" bIns="0" rtlCol="0" anchor="t">
+            <a:spAutoFit/>
+          </a:bodyPr>
+          <a:lstStyle/>
+          <a:p>
+            <a:pPr algn="ctr">
+              <a:lnSpc>
+                <a:spcPts val="4759"/>
+              </a:lnSpc>
+            </a:pPr>
+            <a:r>
+              <a:rPr lang="en-US" sz="3399" dirty="0">
+                <a:solidFill>
+                  <a:srgbClr val="231F20"/>
+                </a:solidFill>
+                <a:latin typeface="Canva Sans"/>
+                <a:ea typeface="Canva Sans"/>
+                <a:cs typeface="Canva Sans"/>
+                <a:sym typeface="Canva Sans"/>
+              </a:rPr>
+              <a:t>1</a:t>
+            </a:r>
+          </a:p>
+        </p:txBody>
+      </p:sp>
+      <p:sp>
+        <p:nvSpPr>
+          <p:cNvPr id="13" name="TextBox 13"/>
+          <p:cNvSpPr txBox="1"/>
+          <p:nvPr/>
+        </p:nvSpPr>
+        <p:spPr>
+          <a:xfrm>
+            <a:off x="3733071" y="6028690"/>
+            <a:ext cx="237053" cy="580390"/>
+          </a:xfrm>
+          <a:prstGeom prst="rect">
+            <a:avLst/>
+          </a:prstGeom>
+        </p:spPr>
+        <p:txBody>
+          <a:bodyPr lIns="0" tIns="0" rIns="0" bIns="0" rtlCol="0" anchor="t">
+            <a:spAutoFit/>
+          </a:bodyPr>
+          <a:lstStyle/>
+          <a:p>
+            <a:pPr algn="ctr">
+              <a:lnSpc>
+                <a:spcPts val="4759"/>
+              </a:lnSpc>
+            </a:pPr>
+            <a:r>
+              <a:rPr lang="en-US" sz="3399">
+                <a:solidFill>
+                  <a:srgbClr val="231F20"/>
+                </a:solidFill>
+                <a:latin typeface="Canva Sans"/>
+                <a:ea typeface="Canva Sans"/>
+                <a:cs typeface="Canva Sans"/>
+                <a:sym typeface="Canva Sans"/>
+              </a:rPr>
+              <a:t>2</a:t>
+            </a:r>
+          </a:p>
+        </p:txBody>
+      </p:sp>
+      <p:sp>
+        <p:nvSpPr>
+          <p:cNvPr id="14" name="TextBox 14"/>
+          <p:cNvSpPr txBox="1"/>
+          <p:nvPr/>
+        </p:nvSpPr>
+        <p:spPr>
+          <a:xfrm>
+            <a:off x="3726344" y="6980555"/>
+            <a:ext cx="250508" cy="580390"/>
+          </a:xfrm>
+          <a:prstGeom prst="rect">
+            <a:avLst/>
+          </a:prstGeom>
+        </p:spPr>
+        <p:txBody>
+          <a:bodyPr lIns="0" tIns="0" rIns="0" bIns="0" rtlCol="0" anchor="t">
+            <a:spAutoFit/>
+          </a:bodyPr>
+          <a:lstStyle/>
+          <a:p>
+            <a:pPr algn="ctr">
+              <a:lnSpc>
+                <a:spcPts val="4759"/>
+              </a:lnSpc>
+            </a:pPr>
+            <a:r>
+              <a:rPr lang="en-US" sz="3399">
+                <a:solidFill>
+                  <a:srgbClr val="231F20"/>
+                </a:solidFill>
+                <a:latin typeface="Canva Sans"/>
+                <a:ea typeface="Canva Sans"/>
+                <a:cs typeface="Canva Sans"/>
+                <a:sym typeface="Canva Sans"/>
+              </a:rPr>
+              <a:t>3</a:t>
+            </a:r>
+          </a:p>
+        </p:txBody>
+      </p:sp>
+      <p:sp>
+        <p:nvSpPr>
+          <p:cNvPr id="15" name="TextBox 15"/>
+          <p:cNvSpPr txBox="1"/>
+          <p:nvPr/>
+        </p:nvSpPr>
+        <p:spPr>
+          <a:xfrm>
+            <a:off x="3720986" y="7932420"/>
+            <a:ext cx="261223" cy="580390"/>
+          </a:xfrm>
+          <a:prstGeom prst="rect">
+            <a:avLst/>
+          </a:prstGeom>
+        </p:spPr>
+        <p:txBody>
+          <a:bodyPr lIns="0" tIns="0" rIns="0" bIns="0" rtlCol="0" anchor="t">
+            <a:spAutoFit/>
+          </a:bodyPr>
+          <a:lstStyle/>
+          <a:p>
+            <a:pPr algn="ctr">
+              <a:lnSpc>
+                <a:spcPts val="4759"/>
+              </a:lnSpc>
+            </a:pPr>
+            <a:r>
+              <a:rPr lang="en-US" sz="3399">
+                <a:solidFill>
+                  <a:srgbClr val="231F20"/>
+                </a:solidFill>
+                <a:latin typeface="Canva Sans"/>
+                <a:ea typeface="Canva Sans"/>
+                <a:cs typeface="Canva Sans"/>
+                <a:sym typeface="Canva Sans"/>
+              </a:rPr>
+              <a:t>4</a:t>
+            </a:r>
+          </a:p>
+        </p:txBody>
+      </p:sp>
+      <p:sp>
+        <p:nvSpPr>
+          <p:cNvPr id="16" name="TextBox 16"/>
+          <p:cNvSpPr txBox="1"/>
+          <p:nvPr/>
+        </p:nvSpPr>
+        <p:spPr>
+          <a:xfrm>
+            <a:off x="5957099" y="5076825"/>
+            <a:ext cx="457319" cy="580390"/>
+          </a:xfrm>
+          <a:prstGeom prst="rect">
+            <a:avLst/>
+          </a:prstGeom>
+        </p:spPr>
+        <p:txBody>
+          <a:bodyPr lIns="0" tIns="0" rIns="0" bIns="0" rtlCol="0" anchor="t">
+            <a:spAutoFit/>
+          </a:bodyPr>
+          <a:lstStyle/>
+          <a:p>
+            <a:pPr algn="ctr">
+              <a:lnSpc>
+                <a:spcPts val="4759"/>
+              </a:lnSpc>
+            </a:pPr>
+            <a:r>
+              <a:rPr lang="en-US" sz="3399">
+                <a:solidFill>
+                  <a:srgbClr val="231F20"/>
+                </a:solidFill>
+                <a:latin typeface="Canva Sans"/>
+                <a:ea typeface="Canva Sans"/>
+                <a:cs typeface="Canva Sans"/>
+                <a:sym typeface="Canva Sans"/>
+              </a:rPr>
+              <a:t>ID</a:t>
+            </a:r>
+          </a:p>
+        </p:txBody>
+      </p:sp>
+      <p:sp>
+        <p:nvSpPr>
+          <p:cNvPr id="17" name="TextBox 17"/>
+          <p:cNvSpPr txBox="1"/>
+          <p:nvPr/>
+        </p:nvSpPr>
+        <p:spPr>
+          <a:xfrm>
+            <a:off x="4756651" y="6028690"/>
+            <a:ext cx="2858214" cy="580390"/>
+          </a:xfrm>
+          <a:prstGeom prst="rect">
+            <a:avLst/>
+          </a:prstGeom>
+        </p:spPr>
+        <p:txBody>
+          <a:bodyPr lIns="0" tIns="0" rIns="0" bIns="0" rtlCol="0" anchor="t">
+            <a:spAutoFit/>
+          </a:bodyPr>
+          <a:lstStyle/>
+          <a:p>
+            <a:pPr algn="ctr">
+              <a:lnSpc>
+                <a:spcPts val="4759"/>
+              </a:lnSpc>
+            </a:pPr>
+            <a:r>
+              <a:rPr lang="en-US" sz="3399">
+                <a:solidFill>
+                  <a:srgbClr val="231F20"/>
+                </a:solidFill>
+                <a:latin typeface="Canva Sans"/>
+                <a:ea typeface="Canva Sans"/>
+                <a:cs typeface="Canva Sans"/>
+                <a:sym typeface="Canva Sans"/>
+              </a:rPr>
+              <a:t>ชื่อเครื่องเล่นเกม</a:t>
+            </a:r>
+          </a:p>
+        </p:txBody>
+      </p:sp>
+      <p:sp>
+        <p:nvSpPr>
+          <p:cNvPr id="18" name="TextBox 18"/>
+          <p:cNvSpPr txBox="1"/>
+          <p:nvPr/>
+        </p:nvSpPr>
+        <p:spPr>
+          <a:xfrm>
+            <a:off x="5608900" y="6980555"/>
+            <a:ext cx="1153716" cy="580390"/>
+          </a:xfrm>
+          <a:prstGeom prst="rect">
+            <a:avLst/>
+          </a:prstGeom>
+        </p:spPr>
+        <p:txBody>
+          <a:bodyPr lIns="0" tIns="0" rIns="0" bIns="0" rtlCol="0" anchor="t">
+            <a:spAutoFit/>
+          </a:bodyPr>
+          <a:lstStyle/>
+          <a:p>
+            <a:pPr algn="ctr">
+              <a:lnSpc>
+                <a:spcPts val="4759"/>
+              </a:lnSpc>
+            </a:pPr>
+            <a:r>
+              <a:rPr lang="en-US" sz="3399">
+                <a:solidFill>
+                  <a:srgbClr val="231F20"/>
+                </a:solidFill>
+                <a:latin typeface="Canva Sans"/>
+                <a:ea typeface="Canva Sans"/>
+                <a:cs typeface="Canva Sans"/>
+                <a:sym typeface="Canva Sans"/>
+              </a:rPr>
+              <a:t>จุดเด่น</a:t>
+            </a:r>
+          </a:p>
+        </p:txBody>
+      </p:sp>
+      <p:sp>
+        <p:nvSpPr>
+          <p:cNvPr id="19" name="TextBox 19"/>
+          <p:cNvSpPr txBox="1"/>
+          <p:nvPr/>
+        </p:nvSpPr>
+        <p:spPr>
+          <a:xfrm>
+            <a:off x="5201766" y="7932420"/>
+            <a:ext cx="1967984" cy="580390"/>
+          </a:xfrm>
+          <a:prstGeom prst="rect">
+            <a:avLst/>
+          </a:prstGeom>
+        </p:spPr>
+        <p:txBody>
+          <a:bodyPr lIns="0" tIns="0" rIns="0" bIns="0" rtlCol="0" anchor="t">
+            <a:spAutoFit/>
+          </a:bodyPr>
+          <a:lstStyle/>
+          <a:p>
+            <a:pPr algn="ctr">
+              <a:lnSpc>
+                <a:spcPts val="4759"/>
+              </a:lnSpc>
+            </a:pPr>
+            <a:r>
+              <a:rPr lang="en-US" sz="3399">
+                <a:solidFill>
+                  <a:srgbClr val="231F20"/>
+                </a:solidFill>
+                <a:latin typeface="Canva Sans"/>
+                <a:ea typeface="Canva Sans"/>
+                <a:cs typeface="Canva Sans"/>
+                <a:sym typeface="Canva Sans"/>
+              </a:rPr>
+              <a:t>ราคาเปิดตัว</a:t>
+            </a:r>
+          </a:p>
+        </p:txBody>
+      </p:sp>
+      <p:sp>
+        <p:nvSpPr>
+          <p:cNvPr id="20" name="TextBox 20"/>
+          <p:cNvSpPr txBox="1"/>
+          <p:nvPr/>
+        </p:nvSpPr>
+        <p:spPr>
+          <a:xfrm>
+            <a:off x="8003575" y="5076825"/>
+            <a:ext cx="1488162" cy="580390"/>
+          </a:xfrm>
+          <a:prstGeom prst="rect">
+            <a:avLst/>
+          </a:prstGeom>
+        </p:spPr>
+        <p:txBody>
+          <a:bodyPr lIns="0" tIns="0" rIns="0" bIns="0" rtlCol="0" anchor="t">
+            <a:spAutoFit/>
+          </a:bodyPr>
+          <a:lstStyle/>
+          <a:p>
+            <a:pPr algn="ctr">
+              <a:lnSpc>
+                <a:spcPts val="4759"/>
+              </a:lnSpc>
+            </a:pPr>
+            <a:r>
+              <a:rPr lang="en-US" sz="3399">
+                <a:solidFill>
+                  <a:srgbClr val="231F20"/>
+                </a:solidFill>
+                <a:latin typeface="Canva Sans"/>
+                <a:ea typeface="Canva Sans"/>
+                <a:cs typeface="Canva Sans"/>
+                <a:sym typeface="Canva Sans"/>
+              </a:rPr>
+              <a:t>Integer</a:t>
+            </a:r>
+          </a:p>
+        </p:txBody>
+      </p:sp>
+      <p:sp>
+        <p:nvSpPr>
+          <p:cNvPr id="21" name="TextBox 21"/>
+          <p:cNvSpPr txBox="1"/>
+          <p:nvPr/>
+        </p:nvSpPr>
+        <p:spPr>
+          <a:xfrm>
+            <a:off x="8126566" y="6028690"/>
+            <a:ext cx="1242179" cy="580390"/>
+          </a:xfrm>
+          <a:prstGeom prst="rect">
+            <a:avLst/>
+          </a:prstGeom>
+        </p:spPr>
+        <p:txBody>
+          <a:bodyPr lIns="0" tIns="0" rIns="0" bIns="0" rtlCol="0" anchor="t">
+            <a:spAutoFit/>
+          </a:bodyPr>
+          <a:lstStyle/>
+          <a:p>
+            <a:pPr algn="ctr">
+              <a:lnSpc>
+                <a:spcPts val="4759"/>
+              </a:lnSpc>
+            </a:pPr>
+            <a:r>
+              <a:rPr lang="en-US" sz="3399">
+                <a:solidFill>
+                  <a:srgbClr val="231F20"/>
+                </a:solidFill>
+                <a:latin typeface="Canva Sans"/>
+                <a:ea typeface="Canva Sans"/>
+                <a:cs typeface="Canva Sans"/>
+                <a:sym typeface="Canva Sans"/>
+              </a:rPr>
+              <a:t>String</a:t>
+            </a:r>
+          </a:p>
+        </p:txBody>
+      </p:sp>
+      <p:sp>
+        <p:nvSpPr>
+          <p:cNvPr id="22" name="TextBox 22"/>
+          <p:cNvSpPr txBox="1"/>
+          <p:nvPr/>
+        </p:nvSpPr>
+        <p:spPr>
+          <a:xfrm>
+            <a:off x="8126566" y="6980555"/>
+            <a:ext cx="1242179" cy="580390"/>
+          </a:xfrm>
+          <a:prstGeom prst="rect">
+            <a:avLst/>
+          </a:prstGeom>
+        </p:spPr>
+        <p:txBody>
+          <a:bodyPr lIns="0" tIns="0" rIns="0" bIns="0" rtlCol="0" anchor="t">
+            <a:spAutoFit/>
+          </a:bodyPr>
+          <a:lstStyle/>
+          <a:p>
+            <a:pPr algn="ctr">
+              <a:lnSpc>
+                <a:spcPts val="4759"/>
+              </a:lnSpc>
+            </a:pPr>
+            <a:r>
+              <a:rPr lang="en-US" sz="3399">
+                <a:solidFill>
+                  <a:srgbClr val="231F20"/>
+                </a:solidFill>
+                <a:latin typeface="Canva Sans"/>
+                <a:ea typeface="Canva Sans"/>
+                <a:cs typeface="Canva Sans"/>
+                <a:sym typeface="Canva Sans"/>
+              </a:rPr>
+              <a:t>String</a:t>
+            </a:r>
+          </a:p>
+        </p:txBody>
+      </p:sp>
+      <p:sp>
+        <p:nvSpPr>
+          <p:cNvPr id="23" name="TextBox 23"/>
+          <p:cNvSpPr txBox="1"/>
+          <p:nvPr/>
+        </p:nvSpPr>
+        <p:spPr>
+          <a:xfrm>
+            <a:off x="8126566" y="7932420"/>
+            <a:ext cx="1242179" cy="580390"/>
+          </a:xfrm>
+          <a:prstGeom prst="rect">
+            <a:avLst/>
+          </a:prstGeom>
+        </p:spPr>
+        <p:txBody>
+          <a:bodyPr lIns="0" tIns="0" rIns="0" bIns="0" rtlCol="0" anchor="t">
+            <a:spAutoFit/>
+          </a:bodyPr>
+          <a:lstStyle/>
+          <a:p>
+            <a:pPr algn="ctr">
+              <a:lnSpc>
+                <a:spcPts val="4759"/>
+              </a:lnSpc>
+            </a:pPr>
+            <a:r>
+              <a:rPr lang="en-US" sz="3399">
+                <a:solidFill>
+                  <a:srgbClr val="231F20"/>
+                </a:solidFill>
+                <a:latin typeface="Canva Sans"/>
+                <a:ea typeface="Canva Sans"/>
+                <a:cs typeface="Canva Sans"/>
+                <a:sym typeface="Canva Sans"/>
+              </a:rPr>
+              <a:t>String</a:t>
+            </a:r>
+          </a:p>
+        </p:txBody>
+      </p:sp>
+      <p:sp>
+        <p:nvSpPr>
+          <p:cNvPr id="24" name="TextBox 24"/>
+          <p:cNvSpPr txBox="1"/>
+          <p:nvPr/>
+        </p:nvSpPr>
+        <p:spPr>
+          <a:xfrm>
+            <a:off x="10175037" y="5076825"/>
+            <a:ext cx="2566273" cy="580390"/>
+          </a:xfrm>
+          <a:prstGeom prst="rect">
+            <a:avLst/>
+          </a:prstGeom>
+        </p:spPr>
+        <p:txBody>
+          <a:bodyPr lIns="0" tIns="0" rIns="0" bIns="0" rtlCol="0" anchor="t">
+            <a:spAutoFit/>
+          </a:bodyPr>
+          <a:lstStyle/>
+          <a:p>
+            <a:pPr algn="ctr">
+              <a:lnSpc>
+                <a:spcPts val="4759"/>
+              </a:lnSpc>
+            </a:pPr>
+            <a:r>
+              <a:rPr lang="en-US" sz="3399">
+                <a:solidFill>
+                  <a:srgbClr val="231F20"/>
+                </a:solidFill>
+                <a:latin typeface="Canva Sans"/>
+                <a:ea typeface="Canva Sans"/>
+                <a:cs typeface="Canva Sans"/>
+                <a:sym typeface="Canva Sans"/>
+              </a:rPr>
+              <a:t>Primary-Key</a:t>
+            </a:r>
+          </a:p>
+        </p:txBody>
+      </p:sp>
+      <p:sp>
+        <p:nvSpPr>
+          <p:cNvPr id="25" name="TextBox 25"/>
+          <p:cNvSpPr txBox="1"/>
+          <p:nvPr/>
+        </p:nvSpPr>
+        <p:spPr>
+          <a:xfrm>
+            <a:off x="11376318" y="6028690"/>
+            <a:ext cx="163711" cy="580390"/>
+          </a:xfrm>
+          <a:prstGeom prst="rect">
+            <a:avLst/>
+          </a:prstGeom>
+        </p:spPr>
+        <p:txBody>
+          <a:bodyPr lIns="0" tIns="0" rIns="0" bIns="0" rtlCol="0" anchor="t">
+            <a:spAutoFit/>
+          </a:bodyPr>
+          <a:lstStyle/>
+          <a:p>
+            <a:pPr algn="ctr">
+              <a:lnSpc>
+                <a:spcPts val="4759"/>
+              </a:lnSpc>
+            </a:pPr>
+            <a:r>
+              <a:rPr lang="en-US" sz="3399">
+                <a:solidFill>
+                  <a:srgbClr val="231F20"/>
+                </a:solidFill>
+                <a:latin typeface="Canva Sans"/>
+                <a:ea typeface="Canva Sans"/>
+                <a:cs typeface="Canva Sans"/>
+                <a:sym typeface="Canva Sans"/>
+              </a:rPr>
+              <a:t>-</a:t>
+            </a:r>
+          </a:p>
+        </p:txBody>
+      </p:sp>
+      <p:sp>
+        <p:nvSpPr>
+          <p:cNvPr id="26" name="TextBox 26"/>
+          <p:cNvSpPr txBox="1"/>
+          <p:nvPr/>
+        </p:nvSpPr>
+        <p:spPr>
+          <a:xfrm>
+            <a:off x="11376318" y="6980555"/>
+            <a:ext cx="163711" cy="580390"/>
+          </a:xfrm>
+          <a:prstGeom prst="rect">
+            <a:avLst/>
+          </a:prstGeom>
+        </p:spPr>
+        <p:txBody>
+          <a:bodyPr lIns="0" tIns="0" rIns="0" bIns="0" rtlCol="0" anchor="t">
+            <a:spAutoFit/>
+          </a:bodyPr>
+          <a:lstStyle/>
+          <a:p>
+            <a:pPr algn="ctr">
+              <a:lnSpc>
+                <a:spcPts val="4759"/>
+              </a:lnSpc>
+            </a:pPr>
+            <a:r>
+              <a:rPr lang="en-US" sz="3399">
+                <a:solidFill>
+                  <a:srgbClr val="231F20"/>
+                </a:solidFill>
+                <a:latin typeface="Canva Sans"/>
+                <a:ea typeface="Canva Sans"/>
+                <a:cs typeface="Canva Sans"/>
+                <a:sym typeface="Canva Sans"/>
+              </a:rPr>
+              <a:t>-</a:t>
+            </a:r>
+          </a:p>
+        </p:txBody>
+      </p:sp>
+      <p:sp>
+        <p:nvSpPr>
+          <p:cNvPr id="27" name="TextBox 27"/>
+          <p:cNvSpPr txBox="1"/>
+          <p:nvPr/>
+        </p:nvSpPr>
+        <p:spPr>
+          <a:xfrm>
+            <a:off x="11376318" y="7932420"/>
+            <a:ext cx="163711" cy="580390"/>
+          </a:xfrm>
+          <a:prstGeom prst="rect">
+            <a:avLst/>
+          </a:prstGeom>
+        </p:spPr>
+        <p:txBody>
+          <a:bodyPr lIns="0" tIns="0" rIns="0" bIns="0" rtlCol="0" anchor="t">
+            <a:spAutoFit/>
+          </a:bodyPr>
+          <a:lstStyle/>
+          <a:p>
+            <a:pPr algn="ctr">
+              <a:lnSpc>
+                <a:spcPts val="4759"/>
+              </a:lnSpc>
+            </a:pPr>
+            <a:r>
+              <a:rPr lang="en-US" sz="3399">
+                <a:solidFill>
+                  <a:srgbClr val="231F20"/>
+                </a:solidFill>
+                <a:latin typeface="Canva Sans"/>
+                <a:ea typeface="Canva Sans"/>
+                <a:cs typeface="Canva Sans"/>
+                <a:sym typeface="Canva Sans"/>
+              </a:rPr>
+              <a:t>-</a:t>
+            </a:r>
+          </a:p>
+        </p:txBody>
+      </p:sp>
+      <p:sp>
+        <p:nvSpPr>
+          <p:cNvPr id="28" name="TextBox 28"/>
+          <p:cNvSpPr txBox="1"/>
+          <p:nvPr/>
+        </p:nvSpPr>
+        <p:spPr>
+          <a:xfrm>
+            <a:off x="14053795" y="5076825"/>
+            <a:ext cx="229791" cy="580390"/>
+          </a:xfrm>
+          <a:prstGeom prst="rect">
+            <a:avLst/>
+          </a:prstGeom>
+        </p:spPr>
+        <p:txBody>
+          <a:bodyPr lIns="0" tIns="0" rIns="0" bIns="0" rtlCol="0" anchor="t">
             <a:spAutoFit/>
           </a:bodyPr>
           <a:lstStyle/>
@@ -4379,677 +5124,21 @@
       </p:sp>
       <p:sp>
         <p:nvSpPr>
-          <p:cNvPr name="TextBox 13" id="13"/>
-          <p:cNvSpPr txBox="true"/>
+          <p:cNvPr id="29" name="TextBox 29"/>
+          <p:cNvSpPr txBox="1"/>
           <p:nvPr/>
         </p:nvSpPr>
         <p:spPr>
-          <a:xfrm rot="0">
-            <a:off x="3733071" y="6028690"/>
-            <a:ext cx="237053" cy="580390"/>
+          <a:xfrm>
+            <a:off x="13768522" y="6028690"/>
+            <a:ext cx="800338" cy="580390"/>
           </a:xfrm>
           <a:prstGeom prst="rect">
             <a:avLst/>
           </a:prstGeom>
         </p:spPr>
         <p:txBody>
-          <a:bodyPr anchor="t" rtlCol="false" tIns="0" lIns="0" bIns="0" rIns="0">
-            <a:spAutoFit/>
-          </a:bodyPr>
-          <a:lstStyle/>
-          <a:p>
-            <a:pPr algn="ctr">
-              <a:lnSpc>
-                <a:spcPts val="4759"/>
-              </a:lnSpc>
-            </a:pPr>
-            <a:r>
-              <a:rPr lang="en-US" sz="3399">
-                <a:solidFill>
-                  <a:srgbClr val="231F20"/>
-                </a:solidFill>
-                <a:latin typeface="Canva Sans"/>
-                <a:ea typeface="Canva Sans"/>
-                <a:cs typeface="Canva Sans"/>
-                <a:sym typeface="Canva Sans"/>
-              </a:rPr>
-              <a:t>2</a:t>
-            </a:r>
-          </a:p>
-        </p:txBody>
-      </p:sp>
-      <p:sp>
-        <p:nvSpPr>
-          <p:cNvPr name="TextBox 14" id="14"/>
-          <p:cNvSpPr txBox="true"/>
-          <p:nvPr/>
-        </p:nvSpPr>
-        <p:spPr>
-          <a:xfrm rot="0">
-            <a:off x="3726344" y="6980555"/>
-            <a:ext cx="250508" cy="580390"/>
-          </a:xfrm>
-          <a:prstGeom prst="rect">
-            <a:avLst/>
-          </a:prstGeom>
-        </p:spPr>
-        <p:txBody>
-          <a:bodyPr anchor="t" rtlCol="false" tIns="0" lIns="0" bIns="0" rIns="0">
-            <a:spAutoFit/>
-          </a:bodyPr>
-          <a:lstStyle/>
-          <a:p>
-            <a:pPr algn="ctr">
-              <a:lnSpc>
-                <a:spcPts val="4759"/>
-              </a:lnSpc>
-            </a:pPr>
-            <a:r>
-              <a:rPr lang="en-US" sz="3399">
-                <a:solidFill>
-                  <a:srgbClr val="231F20"/>
-                </a:solidFill>
-                <a:latin typeface="Canva Sans"/>
-                <a:ea typeface="Canva Sans"/>
-                <a:cs typeface="Canva Sans"/>
-                <a:sym typeface="Canva Sans"/>
-              </a:rPr>
-              <a:t>3</a:t>
-            </a:r>
-          </a:p>
-        </p:txBody>
-      </p:sp>
-      <p:sp>
-        <p:nvSpPr>
-          <p:cNvPr name="TextBox 15" id="15"/>
-          <p:cNvSpPr txBox="true"/>
-          <p:nvPr/>
-        </p:nvSpPr>
-        <p:spPr>
-          <a:xfrm rot="0">
-            <a:off x="3720986" y="7932420"/>
-            <a:ext cx="261223" cy="580390"/>
-          </a:xfrm>
-          <a:prstGeom prst="rect">
-            <a:avLst/>
-          </a:prstGeom>
-        </p:spPr>
-        <p:txBody>
-          <a:bodyPr anchor="t" rtlCol="false" tIns="0" lIns="0" bIns="0" rIns="0">
-            <a:spAutoFit/>
-          </a:bodyPr>
-          <a:lstStyle/>
-          <a:p>
-            <a:pPr algn="ctr">
-              <a:lnSpc>
-                <a:spcPts val="4759"/>
-              </a:lnSpc>
-            </a:pPr>
-            <a:r>
-              <a:rPr lang="en-US" sz="3399">
-                <a:solidFill>
-                  <a:srgbClr val="231F20"/>
-                </a:solidFill>
-                <a:latin typeface="Canva Sans"/>
-                <a:ea typeface="Canva Sans"/>
-                <a:cs typeface="Canva Sans"/>
-                <a:sym typeface="Canva Sans"/>
-              </a:rPr>
-              <a:t>4</a:t>
-            </a:r>
-          </a:p>
-        </p:txBody>
-      </p:sp>
-      <p:sp>
-        <p:nvSpPr>
-          <p:cNvPr name="TextBox 16" id="16"/>
-          <p:cNvSpPr txBox="true"/>
-          <p:nvPr/>
-        </p:nvSpPr>
-        <p:spPr>
-          <a:xfrm rot="0">
-            <a:off x="5957099" y="5076825"/>
-            <a:ext cx="457319" cy="580390"/>
-          </a:xfrm>
-          <a:prstGeom prst="rect">
-            <a:avLst/>
-          </a:prstGeom>
-        </p:spPr>
-        <p:txBody>
-          <a:bodyPr anchor="t" rtlCol="false" tIns="0" lIns="0" bIns="0" rIns="0">
-            <a:spAutoFit/>
-          </a:bodyPr>
-          <a:lstStyle/>
-          <a:p>
-            <a:pPr algn="ctr">
-              <a:lnSpc>
-                <a:spcPts val="4759"/>
-              </a:lnSpc>
-            </a:pPr>
-            <a:r>
-              <a:rPr lang="en-US" sz="3399">
-                <a:solidFill>
-                  <a:srgbClr val="231F20"/>
-                </a:solidFill>
-                <a:latin typeface="Canva Sans"/>
-                <a:ea typeface="Canva Sans"/>
-                <a:cs typeface="Canva Sans"/>
-                <a:sym typeface="Canva Sans"/>
-              </a:rPr>
-              <a:t>ID</a:t>
-            </a:r>
-          </a:p>
-        </p:txBody>
-      </p:sp>
-      <p:sp>
-        <p:nvSpPr>
-          <p:cNvPr name="TextBox 17" id="17"/>
-          <p:cNvSpPr txBox="true"/>
-          <p:nvPr/>
-        </p:nvSpPr>
-        <p:spPr>
-          <a:xfrm rot="0">
-            <a:off x="4756651" y="6028690"/>
-            <a:ext cx="2858214" cy="580390"/>
-          </a:xfrm>
-          <a:prstGeom prst="rect">
-            <a:avLst/>
-          </a:prstGeom>
-        </p:spPr>
-        <p:txBody>
-          <a:bodyPr anchor="t" rtlCol="false" tIns="0" lIns="0" bIns="0" rIns="0">
-            <a:spAutoFit/>
-          </a:bodyPr>
-          <a:lstStyle/>
-          <a:p>
-            <a:pPr algn="ctr">
-              <a:lnSpc>
-                <a:spcPts val="4759"/>
-              </a:lnSpc>
-            </a:pPr>
-            <a:r>
-              <a:rPr lang="en-US" sz="3399">
-                <a:solidFill>
-                  <a:srgbClr val="231F20"/>
-                </a:solidFill>
-                <a:latin typeface="Canva Sans"/>
-                <a:ea typeface="Canva Sans"/>
-                <a:cs typeface="Canva Sans"/>
-                <a:sym typeface="Canva Sans"/>
-              </a:rPr>
-              <a:t>ชื่อเครื่องเล่นเกม</a:t>
-            </a:r>
-          </a:p>
-        </p:txBody>
-      </p:sp>
-      <p:sp>
-        <p:nvSpPr>
-          <p:cNvPr name="TextBox 18" id="18"/>
-          <p:cNvSpPr txBox="true"/>
-          <p:nvPr/>
-        </p:nvSpPr>
-        <p:spPr>
-          <a:xfrm rot="0">
-            <a:off x="5608900" y="6980555"/>
-            <a:ext cx="1153716" cy="580390"/>
-          </a:xfrm>
-          <a:prstGeom prst="rect">
-            <a:avLst/>
-          </a:prstGeom>
-        </p:spPr>
-        <p:txBody>
-          <a:bodyPr anchor="t" rtlCol="false" tIns="0" lIns="0" bIns="0" rIns="0">
-            <a:spAutoFit/>
-          </a:bodyPr>
-          <a:lstStyle/>
-          <a:p>
-            <a:pPr algn="ctr">
-              <a:lnSpc>
-                <a:spcPts val="4759"/>
-              </a:lnSpc>
-            </a:pPr>
-            <a:r>
-              <a:rPr lang="en-US" sz="3399">
-                <a:solidFill>
-                  <a:srgbClr val="231F20"/>
-                </a:solidFill>
-                <a:latin typeface="Canva Sans"/>
-                <a:ea typeface="Canva Sans"/>
-                <a:cs typeface="Canva Sans"/>
-                <a:sym typeface="Canva Sans"/>
-              </a:rPr>
-              <a:t>จุดเด่น</a:t>
-            </a:r>
-          </a:p>
-        </p:txBody>
-      </p:sp>
-      <p:sp>
-        <p:nvSpPr>
-          <p:cNvPr name="TextBox 19" id="19"/>
-          <p:cNvSpPr txBox="true"/>
-          <p:nvPr/>
-        </p:nvSpPr>
-        <p:spPr>
-          <a:xfrm rot="0">
-            <a:off x="5201766" y="7932420"/>
-            <a:ext cx="1967984" cy="580390"/>
-          </a:xfrm>
-          <a:prstGeom prst="rect">
-            <a:avLst/>
-          </a:prstGeom>
-        </p:spPr>
-        <p:txBody>
-          <a:bodyPr anchor="t" rtlCol="false" tIns="0" lIns="0" bIns="0" rIns="0">
-            <a:spAutoFit/>
-          </a:bodyPr>
-          <a:lstStyle/>
-          <a:p>
-            <a:pPr algn="ctr">
-              <a:lnSpc>
-                <a:spcPts val="4759"/>
-              </a:lnSpc>
-            </a:pPr>
-            <a:r>
-              <a:rPr lang="en-US" sz="3399">
-                <a:solidFill>
-                  <a:srgbClr val="231F20"/>
-                </a:solidFill>
-                <a:latin typeface="Canva Sans"/>
-                <a:ea typeface="Canva Sans"/>
-                <a:cs typeface="Canva Sans"/>
-                <a:sym typeface="Canva Sans"/>
-              </a:rPr>
-              <a:t>ราคาเปิดตัว</a:t>
-            </a:r>
-          </a:p>
-        </p:txBody>
-      </p:sp>
-      <p:sp>
-        <p:nvSpPr>
-          <p:cNvPr name="TextBox 20" id="20"/>
-          <p:cNvSpPr txBox="true"/>
-          <p:nvPr/>
-        </p:nvSpPr>
-        <p:spPr>
-          <a:xfrm rot="0">
-            <a:off x="8003575" y="5076825"/>
-            <a:ext cx="1488162" cy="580390"/>
-          </a:xfrm>
-          <a:prstGeom prst="rect">
-            <a:avLst/>
-          </a:prstGeom>
-        </p:spPr>
-        <p:txBody>
-          <a:bodyPr anchor="t" rtlCol="false" tIns="0" lIns="0" bIns="0" rIns="0">
-            <a:spAutoFit/>
-          </a:bodyPr>
-          <a:lstStyle/>
-          <a:p>
-            <a:pPr algn="ctr">
-              <a:lnSpc>
-                <a:spcPts val="4759"/>
-              </a:lnSpc>
-            </a:pPr>
-            <a:r>
-              <a:rPr lang="en-US" sz="3399">
-                <a:solidFill>
-                  <a:srgbClr val="231F20"/>
-                </a:solidFill>
-                <a:latin typeface="Canva Sans"/>
-                <a:ea typeface="Canva Sans"/>
-                <a:cs typeface="Canva Sans"/>
-                <a:sym typeface="Canva Sans"/>
-              </a:rPr>
-              <a:t>Integer</a:t>
-            </a:r>
-          </a:p>
-        </p:txBody>
-      </p:sp>
-      <p:sp>
-        <p:nvSpPr>
-          <p:cNvPr name="TextBox 21" id="21"/>
-          <p:cNvSpPr txBox="true"/>
-          <p:nvPr/>
-        </p:nvSpPr>
-        <p:spPr>
-          <a:xfrm rot="0">
-            <a:off x="8126566" y="6028690"/>
-            <a:ext cx="1242179" cy="580390"/>
-          </a:xfrm>
-          <a:prstGeom prst="rect">
-            <a:avLst/>
-          </a:prstGeom>
-        </p:spPr>
-        <p:txBody>
-          <a:bodyPr anchor="t" rtlCol="false" tIns="0" lIns="0" bIns="0" rIns="0">
-            <a:spAutoFit/>
-          </a:bodyPr>
-          <a:lstStyle/>
-          <a:p>
-            <a:pPr algn="ctr">
-              <a:lnSpc>
-                <a:spcPts val="4759"/>
-              </a:lnSpc>
-            </a:pPr>
-            <a:r>
-              <a:rPr lang="en-US" sz="3399">
-                <a:solidFill>
-                  <a:srgbClr val="231F20"/>
-                </a:solidFill>
-                <a:latin typeface="Canva Sans"/>
-                <a:ea typeface="Canva Sans"/>
-                <a:cs typeface="Canva Sans"/>
-                <a:sym typeface="Canva Sans"/>
-              </a:rPr>
-              <a:t>String</a:t>
-            </a:r>
-          </a:p>
-        </p:txBody>
-      </p:sp>
-      <p:sp>
-        <p:nvSpPr>
-          <p:cNvPr name="TextBox 22" id="22"/>
-          <p:cNvSpPr txBox="true"/>
-          <p:nvPr/>
-        </p:nvSpPr>
-        <p:spPr>
-          <a:xfrm rot="0">
-            <a:off x="8126566" y="6980555"/>
-            <a:ext cx="1242179" cy="580390"/>
-          </a:xfrm>
-          <a:prstGeom prst="rect">
-            <a:avLst/>
-          </a:prstGeom>
-        </p:spPr>
-        <p:txBody>
-          <a:bodyPr anchor="t" rtlCol="false" tIns="0" lIns="0" bIns="0" rIns="0">
-            <a:spAutoFit/>
-          </a:bodyPr>
-          <a:lstStyle/>
-          <a:p>
-            <a:pPr algn="ctr">
-              <a:lnSpc>
-                <a:spcPts val="4759"/>
-              </a:lnSpc>
-            </a:pPr>
-            <a:r>
-              <a:rPr lang="en-US" sz="3399">
-                <a:solidFill>
-                  <a:srgbClr val="231F20"/>
-                </a:solidFill>
-                <a:latin typeface="Canva Sans"/>
-                <a:ea typeface="Canva Sans"/>
-                <a:cs typeface="Canva Sans"/>
-                <a:sym typeface="Canva Sans"/>
-              </a:rPr>
-              <a:t>String</a:t>
-            </a:r>
-          </a:p>
-        </p:txBody>
-      </p:sp>
-      <p:sp>
-        <p:nvSpPr>
-          <p:cNvPr name="TextBox 23" id="23"/>
-          <p:cNvSpPr txBox="true"/>
-          <p:nvPr/>
-        </p:nvSpPr>
-        <p:spPr>
-          <a:xfrm rot="0">
-            <a:off x="8126566" y="7932420"/>
-            <a:ext cx="1242179" cy="580390"/>
-          </a:xfrm>
-          <a:prstGeom prst="rect">
-            <a:avLst/>
-          </a:prstGeom>
-        </p:spPr>
-        <p:txBody>
-          <a:bodyPr anchor="t" rtlCol="false" tIns="0" lIns="0" bIns="0" rIns="0">
-            <a:spAutoFit/>
-          </a:bodyPr>
-          <a:lstStyle/>
-          <a:p>
-            <a:pPr algn="ctr">
-              <a:lnSpc>
-                <a:spcPts val="4759"/>
-              </a:lnSpc>
-            </a:pPr>
-            <a:r>
-              <a:rPr lang="en-US" sz="3399">
-                <a:solidFill>
-                  <a:srgbClr val="231F20"/>
-                </a:solidFill>
-                <a:latin typeface="Canva Sans"/>
-                <a:ea typeface="Canva Sans"/>
-                <a:cs typeface="Canva Sans"/>
-                <a:sym typeface="Canva Sans"/>
-              </a:rPr>
-              <a:t>String</a:t>
-            </a:r>
-          </a:p>
-        </p:txBody>
-      </p:sp>
-      <p:sp>
-        <p:nvSpPr>
-          <p:cNvPr name="TextBox 24" id="24"/>
-          <p:cNvSpPr txBox="true"/>
-          <p:nvPr/>
-        </p:nvSpPr>
-        <p:spPr>
-          <a:xfrm rot="0">
-            <a:off x="10175037" y="5076825"/>
-            <a:ext cx="2566273" cy="580390"/>
-          </a:xfrm>
-          <a:prstGeom prst="rect">
-            <a:avLst/>
-          </a:prstGeom>
-        </p:spPr>
-        <p:txBody>
-          <a:bodyPr anchor="t" rtlCol="false" tIns="0" lIns="0" bIns="0" rIns="0">
-            <a:spAutoFit/>
-          </a:bodyPr>
-          <a:lstStyle/>
-          <a:p>
-            <a:pPr algn="ctr">
-              <a:lnSpc>
-                <a:spcPts val="4759"/>
-              </a:lnSpc>
-            </a:pPr>
-            <a:r>
-              <a:rPr lang="en-US" sz="3399">
-                <a:solidFill>
-                  <a:srgbClr val="231F20"/>
-                </a:solidFill>
-                <a:latin typeface="Canva Sans"/>
-                <a:ea typeface="Canva Sans"/>
-                <a:cs typeface="Canva Sans"/>
-                <a:sym typeface="Canva Sans"/>
-              </a:rPr>
-              <a:t>Primary-Key</a:t>
-            </a:r>
-          </a:p>
-        </p:txBody>
-      </p:sp>
-      <p:sp>
-        <p:nvSpPr>
-          <p:cNvPr name="TextBox 25" id="25"/>
-          <p:cNvSpPr txBox="true"/>
-          <p:nvPr/>
-        </p:nvSpPr>
-        <p:spPr>
-          <a:xfrm rot="0">
-            <a:off x="11376318" y="6028690"/>
-            <a:ext cx="163711" cy="580390"/>
-          </a:xfrm>
-          <a:prstGeom prst="rect">
-            <a:avLst/>
-          </a:prstGeom>
-        </p:spPr>
-        <p:txBody>
-          <a:bodyPr anchor="t" rtlCol="false" tIns="0" lIns="0" bIns="0" rIns="0">
-            <a:spAutoFit/>
-          </a:bodyPr>
-          <a:lstStyle/>
-          <a:p>
-            <a:pPr algn="ctr">
-              <a:lnSpc>
-                <a:spcPts val="4759"/>
-              </a:lnSpc>
-            </a:pPr>
-            <a:r>
-              <a:rPr lang="en-US" sz="3399">
-                <a:solidFill>
-                  <a:srgbClr val="231F20"/>
-                </a:solidFill>
-                <a:latin typeface="Canva Sans"/>
-                <a:ea typeface="Canva Sans"/>
-                <a:cs typeface="Canva Sans"/>
-                <a:sym typeface="Canva Sans"/>
-              </a:rPr>
-              <a:t>-</a:t>
-            </a:r>
-          </a:p>
-        </p:txBody>
-      </p:sp>
-      <p:sp>
-        <p:nvSpPr>
-          <p:cNvPr name="TextBox 26" id="26"/>
-          <p:cNvSpPr txBox="true"/>
-          <p:nvPr/>
-        </p:nvSpPr>
-        <p:spPr>
-          <a:xfrm rot="0">
-            <a:off x="11376318" y="6980555"/>
-            <a:ext cx="163711" cy="580390"/>
-          </a:xfrm>
-          <a:prstGeom prst="rect">
-            <a:avLst/>
-          </a:prstGeom>
-        </p:spPr>
-        <p:txBody>
-          <a:bodyPr anchor="t" rtlCol="false" tIns="0" lIns="0" bIns="0" rIns="0">
-            <a:spAutoFit/>
-          </a:bodyPr>
-          <a:lstStyle/>
-          <a:p>
-            <a:pPr algn="ctr">
-              <a:lnSpc>
-                <a:spcPts val="4759"/>
-              </a:lnSpc>
-            </a:pPr>
-            <a:r>
-              <a:rPr lang="en-US" sz="3399">
-                <a:solidFill>
-                  <a:srgbClr val="231F20"/>
-                </a:solidFill>
-                <a:latin typeface="Canva Sans"/>
-                <a:ea typeface="Canva Sans"/>
-                <a:cs typeface="Canva Sans"/>
-                <a:sym typeface="Canva Sans"/>
-              </a:rPr>
-              <a:t>-</a:t>
-            </a:r>
-          </a:p>
-        </p:txBody>
-      </p:sp>
-      <p:sp>
-        <p:nvSpPr>
-          <p:cNvPr name="TextBox 27" id="27"/>
-          <p:cNvSpPr txBox="true"/>
-          <p:nvPr/>
-        </p:nvSpPr>
-        <p:spPr>
-          <a:xfrm rot="0">
-            <a:off x="11376318" y="7932420"/>
-            <a:ext cx="163711" cy="580390"/>
-          </a:xfrm>
-          <a:prstGeom prst="rect">
-            <a:avLst/>
-          </a:prstGeom>
-        </p:spPr>
-        <p:txBody>
-          <a:bodyPr anchor="t" rtlCol="false" tIns="0" lIns="0" bIns="0" rIns="0">
-            <a:spAutoFit/>
-          </a:bodyPr>
-          <a:lstStyle/>
-          <a:p>
-            <a:pPr algn="ctr">
-              <a:lnSpc>
-                <a:spcPts val="4759"/>
-              </a:lnSpc>
-            </a:pPr>
-            <a:r>
-              <a:rPr lang="en-US" sz="3399">
-                <a:solidFill>
-                  <a:srgbClr val="231F20"/>
-                </a:solidFill>
-                <a:latin typeface="Canva Sans"/>
-                <a:ea typeface="Canva Sans"/>
-                <a:cs typeface="Canva Sans"/>
-                <a:sym typeface="Canva Sans"/>
-              </a:rPr>
-              <a:t>-</a:t>
-            </a:r>
-          </a:p>
-        </p:txBody>
-      </p:sp>
-      <p:sp>
-        <p:nvSpPr>
-          <p:cNvPr name="TextBox 28" id="28"/>
-          <p:cNvSpPr txBox="true"/>
-          <p:nvPr/>
-        </p:nvSpPr>
-        <p:spPr>
-          <a:xfrm rot="0">
-            <a:off x="14053795" y="5076825"/>
-            <a:ext cx="229791" cy="580390"/>
-          </a:xfrm>
-          <a:prstGeom prst="rect">
-            <a:avLst/>
-          </a:prstGeom>
-        </p:spPr>
-        <p:txBody>
-          <a:bodyPr anchor="t" rtlCol="false" tIns="0" lIns="0" bIns="0" rIns="0">
-            <a:spAutoFit/>
-          </a:bodyPr>
-          <a:lstStyle/>
-          <a:p>
-            <a:pPr algn="ctr">
-              <a:lnSpc>
-                <a:spcPts val="4759"/>
-              </a:lnSpc>
-            </a:pPr>
-            <a:r>
-              <a:rPr lang="en-US" sz="3399">
-                <a:solidFill>
-                  <a:srgbClr val="231F20"/>
-                </a:solidFill>
-                <a:latin typeface="Canva Sans"/>
-                <a:ea typeface="Canva Sans"/>
-                <a:cs typeface="Canva Sans"/>
-                <a:sym typeface="Canva Sans"/>
-              </a:rPr>
-              <a:t>1</a:t>
-            </a:r>
-          </a:p>
-        </p:txBody>
-      </p:sp>
-      <p:sp>
-        <p:nvSpPr>
-          <p:cNvPr name="TextBox 29" id="29"/>
-          <p:cNvSpPr txBox="true"/>
-          <p:nvPr/>
-        </p:nvSpPr>
-        <p:spPr>
-          <a:xfrm rot="0">
-            <a:off x="13768522" y="6028690"/>
-            <a:ext cx="800338" cy="580390"/>
-          </a:xfrm>
-          <a:prstGeom prst="rect">
-            <a:avLst/>
-          </a:prstGeom>
-        </p:spPr>
-        <p:txBody>
-          <a:bodyPr anchor="t" rtlCol="false" tIns="0" lIns="0" bIns="0" rIns="0">
+          <a:bodyPr lIns="0" tIns="0" rIns="0" bIns="0" rtlCol="0" anchor="t">
             <a:spAutoFit/>
           </a:bodyPr>
           <a:lstStyle/>
@@ -5076,12 +5165,12 @@
       </p:sp>
       <p:sp>
         <p:nvSpPr>
-          <p:cNvPr name="TextBox 30" id="30"/>
-          <p:cNvSpPr txBox="true"/>
+          <p:cNvPr id="30" name="TextBox 30"/>
+          <p:cNvSpPr txBox="1"/>
           <p:nvPr/>
         </p:nvSpPr>
         <p:spPr>
-          <a:xfrm rot="0">
+          <a:xfrm>
             <a:off x="12741310" y="6826831"/>
             <a:ext cx="3387909" cy="976630"/>
           </a:xfrm>
@@ -5090,7 +5179,7 @@
           </a:prstGeom>
         </p:spPr>
         <p:txBody>
-          <a:bodyPr anchor="t" rtlCol="false" tIns="0" lIns="0" bIns="0" rIns="0">
+          <a:bodyPr lIns="0" tIns="0" rIns="0" bIns="0" rtlCol="0" anchor="t">
             <a:spAutoFit/>
           </a:bodyPr>
           <a:lstStyle/>
@@ -5117,12 +5206,12 @@
       </p:sp>
       <p:sp>
         <p:nvSpPr>
-          <p:cNvPr name="TextBox 31" id="31"/>
-          <p:cNvSpPr txBox="true"/>
+          <p:cNvPr id="31" name="TextBox 31"/>
+          <p:cNvSpPr txBox="1"/>
           <p:nvPr/>
         </p:nvSpPr>
         <p:spPr>
-          <a:xfrm rot="0">
+          <a:xfrm>
             <a:off x="12600571" y="7941945"/>
             <a:ext cx="3528648" cy="976630"/>
           </a:xfrm>
@@ -5131,7 +5220,7 @@
           </a:prstGeom>
         </p:spPr>
         <p:txBody>
-          <a:bodyPr anchor="t" rtlCol="false" tIns="0" lIns="0" bIns="0" rIns="0">
+          <a:bodyPr lIns="0" tIns="0" rIns="0" bIns="0" rtlCol="0" anchor="t">
             <a:spAutoFit/>
           </a:bodyPr>
           <a:lstStyle/>
@@ -5158,99 +5247,127 @@
       </p:sp>
       <p:sp>
         <p:nvSpPr>
-          <p:cNvPr name="AutoShape 32" id="32"/>
+          <p:cNvPr id="32" name="AutoShape 32"/>
           <p:cNvSpPr/>
           <p:nvPr/>
         </p:nvSpPr>
         <p:spPr>
-          <a:xfrm flipV="true">
+          <a:xfrm flipV="1">
             <a:off x="1366465" y="7999095"/>
             <a:ext cx="15892835" cy="0"/>
           </a:xfrm>
           <a:prstGeom prst="line">
             <a:avLst/>
           </a:prstGeom>
-          <a:ln cap="flat" w="38100">
+          <a:ln w="38100" cap="flat">
             <a:solidFill>
               <a:srgbClr val="000000"/>
             </a:solidFill>
             <a:prstDash val="solid"/>
-            <a:headEnd type="none" len="sm" w="sm"/>
-            <a:tailEnd type="none" len="sm" w="sm"/>
+            <a:headEnd type="none" w="sm" len="sm"/>
+            <a:tailEnd type="none" w="sm" len="sm"/>
           </a:ln>
         </p:spPr>
-      </p:sp>
-      <p:sp>
-        <p:nvSpPr>
-          <p:cNvPr name="AutoShape 33" id="33"/>
+        <p:txBody>
+          <a:bodyPr/>
+          <a:lstStyle/>
+          <a:p>
+            <a:endParaRPr lang="en-US"/>
+          </a:p>
+        </p:txBody>
+      </p:sp>
+      <p:sp>
+        <p:nvSpPr>
+          <p:cNvPr id="33" name="AutoShape 33"/>
           <p:cNvSpPr/>
           <p:nvPr/>
         </p:nvSpPr>
         <p:spPr>
-          <a:xfrm flipV="true">
+          <a:xfrm flipV="1">
             <a:off x="1366465" y="6883981"/>
             <a:ext cx="15892835" cy="0"/>
           </a:xfrm>
           <a:prstGeom prst="line">
             <a:avLst/>
           </a:prstGeom>
-          <a:ln cap="flat" w="38100">
+          <a:ln w="38100" cap="flat">
             <a:solidFill>
               <a:srgbClr val="000000"/>
             </a:solidFill>
             <a:prstDash val="solid"/>
-            <a:headEnd type="none" len="sm" w="sm"/>
-            <a:tailEnd type="none" len="sm" w="sm"/>
+            <a:headEnd type="none" w="sm" len="sm"/>
+            <a:tailEnd type="none" w="sm" len="sm"/>
           </a:ln>
         </p:spPr>
-      </p:sp>
-      <p:sp>
-        <p:nvSpPr>
-          <p:cNvPr name="AutoShape 34" id="34"/>
+        <p:txBody>
+          <a:bodyPr/>
+          <a:lstStyle/>
+          <a:p>
+            <a:endParaRPr lang="en-US"/>
+          </a:p>
+        </p:txBody>
+      </p:sp>
+      <p:sp>
+        <p:nvSpPr>
+          <p:cNvPr id="34" name="AutoShape 34"/>
           <p:cNvSpPr/>
           <p:nvPr/>
         </p:nvSpPr>
         <p:spPr>
-          <a:xfrm flipV="true">
+          <a:xfrm flipV="1">
             <a:off x="1366465" y="5676265"/>
             <a:ext cx="15892835" cy="0"/>
           </a:xfrm>
           <a:prstGeom prst="line">
             <a:avLst/>
           </a:prstGeom>
-          <a:ln cap="flat" w="38100">
+          <a:ln w="38100" cap="flat">
             <a:solidFill>
               <a:srgbClr val="000000"/>
             </a:solidFill>
             <a:prstDash val="solid"/>
-            <a:headEnd type="none" len="sm" w="sm"/>
-            <a:tailEnd type="none" len="sm" w="sm"/>
+            <a:headEnd type="none" w="sm" len="sm"/>
+            <a:tailEnd type="none" w="sm" len="sm"/>
           </a:ln>
         </p:spPr>
-      </p:sp>
-      <p:sp>
-        <p:nvSpPr>
-          <p:cNvPr name="AutoShape 35" id="35"/>
+        <p:txBody>
+          <a:bodyPr/>
+          <a:lstStyle/>
+          <a:p>
+            <a:endParaRPr lang="en-US"/>
+          </a:p>
+        </p:txBody>
+      </p:sp>
+      <p:sp>
+        <p:nvSpPr>
+          <p:cNvPr id="35" name="AutoShape 35"/>
           <p:cNvSpPr/>
           <p:nvPr/>
         </p:nvSpPr>
         <p:spPr>
-          <a:xfrm flipV="true">
+          <a:xfrm flipV="1">
             <a:off x="1366465" y="4729147"/>
             <a:ext cx="15892835" cy="0"/>
           </a:xfrm>
           <a:prstGeom prst="line">
             <a:avLst/>
           </a:prstGeom>
-          <a:ln cap="flat" w="38100">
+          <a:ln w="38100" cap="flat">
             <a:solidFill>
               <a:srgbClr val="000000"/>
             </a:solidFill>
             <a:prstDash val="solid"/>
-            <a:headEnd type="none" len="sm" w="sm"/>
-            <a:tailEnd type="none" len="sm" w="sm"/>
+            <a:headEnd type="none" w="sm" len="sm"/>
+            <a:tailEnd type="none" w="sm" len="sm"/>
           </a:ln>
         </p:spPr>
+        <p:txBody>
+          <a:bodyPr/>
+          <a:lstStyle/>
+          <a:p>
+            <a:endParaRPr lang="en-US"/>
+          </a:p>
+        </p:txBody>
       </p:sp>
     </p:spTree>
   </p:cSld>
@@ -5261,7 +5378,7 @@
 </file>
 
 <file path=ppt/slides/slide4.xml><?xml version="1.0" encoding="utf-8"?>
-<p:sld xmlns:p="http://schemas.openxmlformats.org/presentationml/2006/main" xmlns:a="http://schemas.openxmlformats.org/drawingml/2006/main" xmlns:r="http://schemas.openxmlformats.org/officeDocument/2006/relationships">
+<p:sld xmlns:a="http://schemas.openxmlformats.org/drawingml/2006/main" xmlns:r="http://schemas.openxmlformats.org/officeDocument/2006/relationships" xmlns:p="http://schemas.openxmlformats.org/presentationml/2006/main">
   <p:cSld>
     <p:spTree>
       <p:nvGrpSpPr>
@@ -5279,12 +5396,12 @@
       </p:grpSpPr>
       <p:sp>
         <p:nvSpPr>
-          <p:cNvPr name="Freeform 2" id="2"/>
+          <p:cNvPr id="2" name="Freeform 2"/>
           <p:cNvSpPr/>
           <p:nvPr/>
         </p:nvSpPr>
         <p:spPr>
-          <a:xfrm flipH="true" flipV="true" rot="0">
+          <a:xfrm flipH="1" flipV="1">
             <a:off x="0" y="0"/>
             <a:ext cx="18288000" cy="10287000"/>
           </a:xfrm>
@@ -5293,9 +5410,9 @@
             <a:gdLst/>
             <a:ahLst/>
             <a:cxnLst/>
-            <a:rect r="r" b="b" t="t" l="l"/>
+            <a:rect l="l" t="t" r="r" b="b"/>
             <a:pathLst>
-              <a:path h="10287000" w="18288000">
+              <a:path w="18288000" h="10287000">
                 <a:moveTo>
                   <a:pt x="18288000" y="10287000"/>
                 </a:moveTo>
@@ -5318,19 +5435,26 @@
           <a:blipFill>
             <a:blip r:embed="rId2"/>
             <a:stretch>
-              <a:fillRect l="0" t="-38888" r="0" b="-38888"/>
+              <a:fillRect t="-38888" b="-38888"/>
             </a:stretch>
           </a:blipFill>
         </p:spPr>
+        <p:txBody>
+          <a:bodyPr/>
+          <a:lstStyle/>
+          <a:p>
+            <a:endParaRPr lang="en-US"/>
+          </a:p>
+        </p:txBody>
       </p:sp>
       <p:grpSp>
         <p:nvGrpSpPr>
-          <p:cNvPr name="Group 3" id="3"/>
+          <p:cNvPr id="3" name="Group 3"/>
           <p:cNvGrpSpPr/>
           <p:nvPr/>
         </p:nvGrpSpPr>
         <p:grpSpPr>
-          <a:xfrm rot="0">
+          <a:xfrm>
             <a:off x="13662994" y="337474"/>
             <a:ext cx="4296549" cy="9570246"/>
             <a:chOff x="0" y="0"/>
@@ -5339,12 +5463,12 @@
         </p:grpSpPr>
         <p:sp>
           <p:nvSpPr>
-            <p:cNvPr name="Freeform 4" id="4"/>
+            <p:cNvPr id="4" name="Freeform 4"/>
             <p:cNvSpPr/>
             <p:nvPr/>
           </p:nvSpPr>
           <p:spPr>
-            <a:xfrm flipH="false" flipV="false" rot="0">
+            <a:xfrm>
               <a:off x="0" y="0"/>
               <a:ext cx="1131601" cy="2520559"/>
             </a:xfrm>
@@ -5353,9 +5477,9 @@
               <a:gdLst/>
               <a:ahLst/>
               <a:cxnLst/>
-              <a:rect r="r" b="b" t="t" l="l"/>
+              <a:rect l="l" t="t" r="r" b="b"/>
               <a:pathLst>
-                <a:path h="2520559" w="1131601">
+                <a:path w="1131601" h="2520559">
                   <a:moveTo>
                     <a:pt x="0" y="0"/>
                   </a:moveTo>
@@ -5376,11 +5500,18 @@
               <a:srgbClr val="CCCCCC"/>
             </a:solidFill>
           </p:spPr>
+          <p:txBody>
+            <a:bodyPr/>
+            <a:lstStyle/>
+            <a:p>
+              <a:endParaRPr lang="en-US"/>
+            </a:p>
+          </p:txBody>
         </p:sp>
         <p:sp>
           <p:nvSpPr>
-            <p:cNvPr name="TextBox 5" id="5"/>
-            <p:cNvSpPr txBox="true"/>
+            <p:cNvPr id="5" name="TextBox 5"/>
+            <p:cNvSpPr txBox="1"/>
             <p:nvPr/>
           </p:nvSpPr>
           <p:spPr>
@@ -5393,7 +5524,7 @@
             </a:prstGeom>
           </p:spPr>
           <p:txBody>
-            <a:bodyPr anchor="ctr" rtlCol="false" tIns="50800" lIns="50800" bIns="50800" rIns="50800"/>
+            <a:bodyPr lIns="50800" tIns="50800" rIns="50800" bIns="50800" rtlCol="0" anchor="ctr"/>
             <a:lstStyle/>
             <a:p>
               <a:pPr algn="ctr">
@@ -5401,18 +5532,19 @@
                   <a:spcPts val="2859"/>
                 </a:lnSpc>
               </a:pPr>
+              <a:endParaRPr/>
             </a:p>
           </p:txBody>
         </p:sp>
       </p:grpSp>
       <p:sp>
         <p:nvSpPr>
-          <p:cNvPr name="Freeform 6" id="6"/>
+          <p:cNvPr id="6" name="Freeform 6"/>
           <p:cNvSpPr/>
           <p:nvPr/>
         </p:nvSpPr>
         <p:spPr>
-          <a:xfrm flipH="false" flipV="false" rot="0">
+          <a:xfrm>
             <a:off x="761502" y="4828880"/>
             <a:ext cx="9752965" cy="1032847"/>
           </a:xfrm>
@@ -5421,9 +5553,9 @@
             <a:gdLst/>
             <a:ahLst/>
             <a:cxnLst/>
-            <a:rect r="r" b="b" t="t" l="l"/>
+            <a:rect l="l" t="t" r="r" b="b"/>
             <a:pathLst>
-              <a:path h="1032847" w="9752965">
+              <a:path w="9752965" h="1032847">
                 <a:moveTo>
                   <a:pt x="0" y="0"/>
                 </a:moveTo>
@@ -5446,19 +5578,26 @@
           <a:blipFill>
             <a:blip r:embed="rId3"/>
             <a:stretch>
-              <a:fillRect l="0" t="-86495" r="0" b="0"/>
+              <a:fillRect t="-86495"/>
             </a:stretch>
           </a:blipFill>
         </p:spPr>
+        <p:txBody>
+          <a:bodyPr/>
+          <a:lstStyle/>
+          <a:p>
+            <a:endParaRPr lang="en-US"/>
+          </a:p>
+        </p:txBody>
       </p:sp>
       <p:grpSp>
         <p:nvGrpSpPr>
-          <p:cNvPr name="Group 7" id="7"/>
+          <p:cNvPr id="7" name="Group 7"/>
           <p:cNvGrpSpPr/>
           <p:nvPr/>
         </p:nvGrpSpPr>
         <p:grpSpPr>
-          <a:xfrm rot="0">
+          <a:xfrm>
             <a:off x="761502" y="3173598"/>
             <a:ext cx="9610044" cy="1948998"/>
             <a:chOff x="0" y="0"/>
@@ -5467,12 +5606,12 @@
         </p:grpSpPr>
         <p:sp>
           <p:nvSpPr>
-            <p:cNvPr name="Freeform 8" id="8"/>
+            <p:cNvPr id="8" name="Freeform 8"/>
             <p:cNvSpPr/>
             <p:nvPr/>
           </p:nvSpPr>
           <p:spPr>
-            <a:xfrm flipH="false" flipV="false" rot="0">
+            <a:xfrm>
               <a:off x="0" y="0"/>
               <a:ext cx="3682024" cy="746746"/>
             </a:xfrm>
@@ -5481,9 +5620,9 @@
               <a:gdLst/>
               <a:ahLst/>
               <a:cxnLst/>
-              <a:rect r="r" b="b" t="t" l="l"/>
+              <a:rect l="l" t="t" r="r" b="b"/>
               <a:pathLst>
-                <a:path h="746746" w="3682024">
+                <a:path w="3682024" h="746746">
                   <a:moveTo>
                     <a:pt x="80561" y="0"/>
                   </a:moveTo>
@@ -5542,11 +5681,18 @@
               <a:srgbClr val="CCCCCC"/>
             </a:solidFill>
           </p:spPr>
+          <p:txBody>
+            <a:bodyPr/>
+            <a:lstStyle/>
+            <a:p>
+              <a:endParaRPr lang="en-US"/>
+            </a:p>
+          </p:txBody>
         </p:sp>
         <p:sp>
           <p:nvSpPr>
-            <p:cNvPr name="TextBox 9" id="9"/>
-            <p:cNvSpPr txBox="true"/>
+            <p:cNvPr id="9" name="TextBox 9"/>
+            <p:cNvSpPr txBox="1"/>
             <p:nvPr/>
           </p:nvSpPr>
           <p:spPr>
@@ -5559,7 +5705,7 @@
             </a:prstGeom>
           </p:spPr>
           <p:txBody>
-            <a:bodyPr anchor="ctr" rtlCol="false" tIns="50800" lIns="50800" bIns="50800" rIns="50800"/>
+            <a:bodyPr lIns="50800" tIns="50800" rIns="50800" bIns="50800" rtlCol="0" anchor="ctr"/>
             <a:lstStyle/>
             <a:p>
               <a:pPr algn="ctr">
@@ -5567,18 +5713,19 @@
                   <a:spcPts val="2859"/>
                 </a:lnSpc>
               </a:pPr>
+              <a:endParaRPr/>
             </a:p>
           </p:txBody>
         </p:sp>
       </p:grpSp>
       <p:sp>
         <p:nvSpPr>
-          <p:cNvPr name="Freeform 10" id="10"/>
+          <p:cNvPr id="10" name="Freeform 10"/>
           <p:cNvSpPr/>
           <p:nvPr/>
         </p:nvSpPr>
         <p:spPr>
-          <a:xfrm flipH="false" flipV="false" rot="0">
+          <a:xfrm>
             <a:off x="-2779578" y="7341318"/>
             <a:ext cx="7616557" cy="7815497"/>
           </a:xfrm>
@@ -5587,9 +5734,9 @@
             <a:gdLst/>
             <a:ahLst/>
             <a:cxnLst/>
-            <a:rect r="r" b="b" t="t" l="l"/>
+            <a:rect l="l" t="t" r="r" b="b"/>
             <a:pathLst>
-              <a:path h="7815497" w="7616557">
+              <a:path w="7616557" h="7815497">
                 <a:moveTo>
                   <a:pt x="0" y="0"/>
                 </a:moveTo>
@@ -5618,19 +5765,26 @@
               </a:extLst>
             </a:blip>
             <a:stretch>
-              <a:fillRect l="0" t="0" r="0" b="0"/>
+              <a:fillRect/>
             </a:stretch>
           </a:blipFill>
         </p:spPr>
-      </p:sp>
-      <p:sp>
-        <p:nvSpPr>
-          <p:cNvPr name="Freeform 11" id="11"/>
+        <p:txBody>
+          <a:bodyPr/>
+          <a:lstStyle/>
+          <a:p>
+            <a:endParaRPr lang="en-US"/>
+          </a:p>
+        </p:txBody>
+      </p:sp>
+      <p:sp>
+        <p:nvSpPr>
+          <p:cNvPr id="11" name="Freeform 11"/>
           <p:cNvSpPr/>
           <p:nvPr/>
         </p:nvSpPr>
         <p:spPr>
-          <a:xfrm flipH="false" flipV="false" rot="0">
+          <a:xfrm>
             <a:off x="14730192" y="-2223846"/>
             <a:ext cx="7616557" cy="7815497"/>
           </a:xfrm>
@@ -5639,9 +5793,9 @@
             <a:gdLst/>
             <a:ahLst/>
             <a:cxnLst/>
-            <a:rect r="r" b="b" t="t" l="l"/>
+            <a:rect l="l" t="t" r="r" b="b"/>
             <a:pathLst>
-              <a:path h="7815497" w="7616557">
+              <a:path w="7616557" h="7815497">
                 <a:moveTo>
                   <a:pt x="0" y="0"/>
                 </a:moveTo>
@@ -5670,19 +5824,26 @@
               </a:extLst>
             </a:blip>
             <a:stretch>
-              <a:fillRect l="0" t="0" r="0" b="0"/>
+              <a:fillRect/>
             </a:stretch>
           </a:blipFill>
         </p:spPr>
-      </p:sp>
-      <p:sp>
-        <p:nvSpPr>
-          <p:cNvPr name="Freeform 12" id="12"/>
+        <p:txBody>
+          <a:bodyPr/>
+          <a:lstStyle/>
+          <a:p>
+            <a:endParaRPr lang="en-US"/>
+          </a:p>
+        </p:txBody>
+      </p:sp>
+      <p:sp>
+        <p:nvSpPr>
+          <p:cNvPr id="12" name="Freeform 12"/>
           <p:cNvSpPr/>
           <p:nvPr/>
         </p:nvSpPr>
         <p:spPr>
-          <a:xfrm flipH="false" flipV="false" rot="0">
+          <a:xfrm>
             <a:off x="10539584" y="695035"/>
             <a:ext cx="4112869" cy="7687605"/>
           </a:xfrm>
@@ -5691,9 +5852,9 @@
             <a:gdLst/>
             <a:ahLst/>
             <a:cxnLst/>
-            <a:rect r="r" b="b" t="t" l="l"/>
+            <a:rect l="l" t="t" r="r" b="b"/>
             <a:pathLst>
-              <a:path h="7687605" w="4112869">
+              <a:path w="4112869" h="7687605">
                 <a:moveTo>
                   <a:pt x="0" y="0"/>
                 </a:moveTo>
@@ -5716,19 +5877,26 @@
           <a:blipFill>
             <a:blip r:embed="rId6"/>
             <a:stretch>
-              <a:fillRect l="0" t="0" r="0" b="0"/>
+              <a:fillRect/>
             </a:stretch>
           </a:blipFill>
         </p:spPr>
-      </p:sp>
-      <p:sp>
-        <p:nvSpPr>
-          <p:cNvPr name="Freeform 13" id="13"/>
+        <p:txBody>
+          <a:bodyPr/>
+          <a:lstStyle/>
+          <a:p>
+            <a:endParaRPr lang="en-US"/>
+          </a:p>
+        </p:txBody>
+      </p:sp>
+      <p:sp>
+        <p:nvSpPr>
+          <p:cNvPr id="13" name="Freeform 13"/>
           <p:cNvSpPr/>
           <p:nvPr/>
         </p:nvSpPr>
         <p:spPr>
-          <a:xfrm flipH="false" flipV="false" rot="0">
+          <a:xfrm>
             <a:off x="13484862" y="2797611"/>
             <a:ext cx="3950531" cy="7332773"/>
           </a:xfrm>
@@ -5737,9 +5905,9 @@
             <a:gdLst/>
             <a:ahLst/>
             <a:cxnLst/>
-            <a:rect r="r" b="b" t="t" l="l"/>
+            <a:rect l="l" t="t" r="r" b="b"/>
             <a:pathLst>
-              <a:path h="7332773" w="3950531">
+              <a:path w="3950531" h="7332773">
                 <a:moveTo>
                   <a:pt x="0" y="0"/>
                 </a:moveTo>
@@ -5762,19 +5930,26 @@
           <a:blipFill>
             <a:blip r:embed="rId7"/>
             <a:stretch>
-              <a:fillRect l="0" t="0" r="0" b="0"/>
+              <a:fillRect/>
             </a:stretch>
           </a:blipFill>
         </p:spPr>
-      </p:sp>
-      <p:sp>
-        <p:nvSpPr>
-          <p:cNvPr name="TextBox 14" id="14"/>
-          <p:cNvSpPr txBox="true"/>
+        <p:txBody>
+          <a:bodyPr/>
+          <a:lstStyle/>
+          <a:p>
+            <a:endParaRPr lang="en-US"/>
+          </a:p>
+        </p:txBody>
+      </p:sp>
+      <p:sp>
+        <p:nvSpPr>
+          <p:cNvPr id="14" name="TextBox 14"/>
+          <p:cNvSpPr txBox="1"/>
           <p:nvPr/>
         </p:nvSpPr>
         <p:spPr>
-          <a:xfrm rot="0">
+          <a:xfrm>
             <a:off x="2142191" y="888605"/>
             <a:ext cx="7416941" cy="1686342"/>
           </a:xfrm>
@@ -5783,7 +5958,7 @@
           </a:prstGeom>
         </p:spPr>
         <p:txBody>
-          <a:bodyPr anchor="t" rtlCol="false" tIns="0" lIns="0" bIns="0" rIns="0">
+          <a:bodyPr lIns="0" tIns="0" rIns="0" bIns="0" rtlCol="0" anchor="t">
             <a:spAutoFit/>
           </a:bodyPr>
           <a:lstStyle/>
@@ -5794,7 +5969,7 @@
               </a:lnSpc>
             </a:pPr>
             <a:r>
-              <a:rPr lang="en-US" b="true" sz="9981" spc="978">
+              <a:rPr lang="en-US" sz="9981" b="1" spc="978">
                 <a:solidFill>
                   <a:srgbClr val="231F20"/>
                 </a:solidFill>
@@ -5810,12 +5985,12 @@
       </p:sp>
       <p:sp>
         <p:nvSpPr>
-          <p:cNvPr name="TextBox 15" id="15"/>
-          <p:cNvSpPr txBox="true"/>
+          <p:cNvPr id="15" name="TextBox 15"/>
+          <p:cNvSpPr txBox="1"/>
           <p:nvPr/>
         </p:nvSpPr>
         <p:spPr>
-          <a:xfrm rot="0">
+          <a:xfrm>
             <a:off x="1383100" y="3270271"/>
             <a:ext cx="8366848" cy="1669928"/>
           </a:xfrm>
@@ -5824,7 +5999,7 @@
           </a:prstGeom>
         </p:spPr>
         <p:txBody>
-          <a:bodyPr anchor="t" rtlCol="false" tIns="0" lIns="0" bIns="0" rIns="0">
+          <a:bodyPr lIns="0" tIns="0" rIns="0" bIns="0" rtlCol="0" anchor="t">
             <a:spAutoFit/>
           </a:bodyPr>
           <a:lstStyle/>
@@ -5835,7 +6010,7 @@
               </a:lnSpc>
             </a:pPr>
             <a:r>
-              <a:rPr lang="en-US" sz="4801" b="true">
+              <a:rPr lang="en-US" sz="4801" b="1">
                 <a:solidFill>
                   <a:srgbClr val="231F20"/>
                 </a:solidFill>

</xml_diff>